<commit_message>
adding core channel manager
</commit_message>
<xml_diff>
--- a/doc/modbus_arch.pptx
+++ b/doc/modbus_arch.pptx
@@ -7,6 +7,10 @@
   <p:sldIdLst>
     <p:sldId id="256" r:id="rId2"/>
     <p:sldId id="257" r:id="rId3"/>
+    <p:sldId id="258" r:id="rId4"/>
+    <p:sldId id="259" r:id="rId5"/>
+    <p:sldId id="260" r:id="rId6"/>
+    <p:sldId id="261" r:id="rId7"/>
   </p:sldIdLst>
   <p:sldSz cx="12192000" cy="6858000"/>
   <p:notesSz cx="6858000" cy="9144000"/>
@@ -105,6 +109,11 @@
       </a:defRPr>
     </a:lvl9pPr>
   </p:defaultTextStyle>
+  <p:extLst>
+    <p:ext uri="{EFAFB233-063F-42B5-8137-9DF3F51BA10A}">
+      <p15:sldGuideLst xmlns:p15="http://schemas.microsoft.com/office/powerpoint/2012/main"/>
+    </p:ext>
+  </p:extLst>
 </p:presentation>
 </file>
 
@@ -239,7 +248,7 @@
           <a:p>
             <a:fld id="{671CEEF1-4AAA-422D-8A53-F6AC8A155E59}" type="datetimeFigureOut">
               <a:rPr lang="ko-KR" altLang="en-US" smtClean="0"/>
-              <a:t>2018-04-02</a:t>
+              <a:t>2018-04-04</a:t>
             </a:fld>
             <a:endParaRPr lang="ko-KR" altLang="en-US"/>
           </a:p>
@@ -409,7 +418,7 @@
           <a:p>
             <a:fld id="{671CEEF1-4AAA-422D-8A53-F6AC8A155E59}" type="datetimeFigureOut">
               <a:rPr lang="ko-KR" altLang="en-US" smtClean="0"/>
-              <a:t>2018-04-02</a:t>
+              <a:t>2018-04-04</a:t>
             </a:fld>
             <a:endParaRPr lang="ko-KR" altLang="en-US"/>
           </a:p>
@@ -589,7 +598,7 @@
           <a:p>
             <a:fld id="{671CEEF1-4AAA-422D-8A53-F6AC8A155E59}" type="datetimeFigureOut">
               <a:rPr lang="ko-KR" altLang="en-US" smtClean="0"/>
-              <a:t>2018-04-02</a:t>
+              <a:t>2018-04-04</a:t>
             </a:fld>
             <a:endParaRPr lang="ko-KR" altLang="en-US"/>
           </a:p>
@@ -759,7 +768,7 @@
           <a:p>
             <a:fld id="{671CEEF1-4AAA-422D-8A53-F6AC8A155E59}" type="datetimeFigureOut">
               <a:rPr lang="ko-KR" altLang="en-US" smtClean="0"/>
-              <a:t>2018-04-02</a:t>
+              <a:t>2018-04-04</a:t>
             </a:fld>
             <a:endParaRPr lang="ko-KR" altLang="en-US"/>
           </a:p>
@@ -1005,7 +1014,7 @@
           <a:p>
             <a:fld id="{671CEEF1-4AAA-422D-8A53-F6AC8A155E59}" type="datetimeFigureOut">
               <a:rPr lang="ko-KR" altLang="en-US" smtClean="0"/>
-              <a:t>2018-04-02</a:t>
+              <a:t>2018-04-04</a:t>
             </a:fld>
             <a:endParaRPr lang="ko-KR" altLang="en-US"/>
           </a:p>
@@ -1237,7 +1246,7 @@
           <a:p>
             <a:fld id="{671CEEF1-4AAA-422D-8A53-F6AC8A155E59}" type="datetimeFigureOut">
               <a:rPr lang="ko-KR" altLang="en-US" smtClean="0"/>
-              <a:t>2018-04-02</a:t>
+              <a:t>2018-04-04</a:t>
             </a:fld>
             <a:endParaRPr lang="ko-KR" altLang="en-US"/>
           </a:p>
@@ -1604,7 +1613,7 @@
           <a:p>
             <a:fld id="{671CEEF1-4AAA-422D-8A53-F6AC8A155E59}" type="datetimeFigureOut">
               <a:rPr lang="ko-KR" altLang="en-US" smtClean="0"/>
-              <a:t>2018-04-02</a:t>
+              <a:t>2018-04-04</a:t>
             </a:fld>
             <a:endParaRPr lang="ko-KR" altLang="en-US"/>
           </a:p>
@@ -1722,7 +1731,7 @@
           <a:p>
             <a:fld id="{671CEEF1-4AAA-422D-8A53-F6AC8A155E59}" type="datetimeFigureOut">
               <a:rPr lang="ko-KR" altLang="en-US" smtClean="0"/>
-              <a:t>2018-04-02</a:t>
+              <a:t>2018-04-04</a:t>
             </a:fld>
             <a:endParaRPr lang="ko-KR" altLang="en-US"/>
           </a:p>
@@ -1817,7 +1826,7 @@
           <a:p>
             <a:fld id="{671CEEF1-4AAA-422D-8A53-F6AC8A155E59}" type="datetimeFigureOut">
               <a:rPr lang="ko-KR" altLang="en-US" smtClean="0"/>
-              <a:t>2018-04-02</a:t>
+              <a:t>2018-04-04</a:t>
             </a:fld>
             <a:endParaRPr lang="ko-KR" altLang="en-US"/>
           </a:p>
@@ -2094,7 +2103,7 @@
           <a:p>
             <a:fld id="{671CEEF1-4AAA-422D-8A53-F6AC8A155E59}" type="datetimeFigureOut">
               <a:rPr lang="ko-KR" altLang="en-US" smtClean="0"/>
-              <a:t>2018-04-02</a:t>
+              <a:t>2018-04-04</a:t>
             </a:fld>
             <a:endParaRPr lang="ko-KR" altLang="en-US"/>
           </a:p>
@@ -2347,7 +2356,7 @@
           <a:p>
             <a:fld id="{671CEEF1-4AAA-422D-8A53-F6AC8A155E59}" type="datetimeFigureOut">
               <a:rPr lang="ko-KR" altLang="en-US" smtClean="0"/>
-              <a:t>2018-04-02</a:t>
+              <a:t>2018-04-04</a:t>
             </a:fld>
             <a:endParaRPr lang="ko-KR" altLang="en-US"/>
           </a:p>
@@ -2560,7 +2569,7 @@
           <a:p>
             <a:fld id="{671CEEF1-4AAA-422D-8A53-F6AC8A155E59}" type="datetimeFigureOut">
               <a:rPr lang="ko-KR" altLang="en-US" smtClean="0"/>
-              <a:t>2018-04-02</a:t>
+              <a:t>2018-04-04</a:t>
             </a:fld>
             <a:endParaRPr lang="ko-KR" altLang="en-US"/>
           </a:p>
@@ -3823,6 +3832,4407 @@
 </p:sld>
 </file>
 
+<file path=ppt/slides/slide3.xml><?xml version="1.0" encoding="utf-8"?>
+<p:sld xmlns:a="http://schemas.openxmlformats.org/drawingml/2006/main" xmlns:r="http://schemas.openxmlformats.org/officeDocument/2006/relationships" xmlns:p="http://schemas.openxmlformats.org/presentationml/2006/main">
+  <p:cSld>
+    <p:spTree>
+      <p:nvGrpSpPr>
+        <p:cNvPr id="1" name=""/>
+        <p:cNvGrpSpPr/>
+        <p:nvPr/>
+      </p:nvGrpSpPr>
+      <p:grpSpPr>
+        <a:xfrm>
+          <a:off x="0" y="0"/>
+          <a:ext cx="0" cy="0"/>
+          <a:chOff x="0" y="0"/>
+          <a:chExt cx="0" cy="0"/>
+        </a:xfrm>
+      </p:grpSpPr>
+      <p:sp>
+        <p:nvSpPr>
+          <p:cNvPr id="4" name="직사각형 3"/>
+          <p:cNvSpPr/>
+          <p:nvPr/>
+        </p:nvSpPr>
+        <p:spPr>
+          <a:xfrm>
+            <a:off x="1705113" y="5735442"/>
+            <a:ext cx="2686755" cy="626532"/>
+          </a:xfrm>
+          <a:prstGeom prst="rect">
+            <a:avLst/>
+          </a:prstGeom>
+        </p:spPr>
+        <p:style>
+          <a:lnRef idx="2">
+            <a:schemeClr val="accent1">
+              <a:shade val="50000"/>
+            </a:schemeClr>
+          </a:lnRef>
+          <a:fillRef idx="1">
+            <a:schemeClr val="accent1"/>
+          </a:fillRef>
+          <a:effectRef idx="0">
+            <a:schemeClr val="accent1"/>
+          </a:effectRef>
+          <a:fontRef idx="minor">
+            <a:schemeClr val="lt1"/>
+          </a:fontRef>
+        </p:style>
+        <p:txBody>
+          <a:bodyPr rtlCol="0" anchor="ctr"/>
+          <a:lstStyle/>
+          <a:p>
+            <a:pPr algn="ctr"/>
+            <a:r>
+              <a:rPr lang="en-US" altLang="ko-KR" sz="1100" dirty="0" smtClean="0"/>
+              <a:t>Modbus Slave Driver</a:t>
+            </a:r>
+            <a:endParaRPr lang="en-US" altLang="ko-KR" sz="1100" dirty="0" smtClean="0"/>
+          </a:p>
+        </p:txBody>
+      </p:sp>
+      <p:sp>
+        <p:nvSpPr>
+          <p:cNvPr id="5" name="직사각형 4"/>
+          <p:cNvSpPr/>
+          <p:nvPr/>
+        </p:nvSpPr>
+        <p:spPr>
+          <a:xfrm>
+            <a:off x="3907744" y="2988526"/>
+            <a:ext cx="2686755" cy="626532"/>
+          </a:xfrm>
+          <a:prstGeom prst="rect">
+            <a:avLst/>
+          </a:prstGeom>
+        </p:spPr>
+        <p:style>
+          <a:lnRef idx="2">
+            <a:schemeClr val="accent1">
+              <a:shade val="50000"/>
+            </a:schemeClr>
+          </a:lnRef>
+          <a:fillRef idx="1">
+            <a:schemeClr val="accent1"/>
+          </a:fillRef>
+          <a:effectRef idx="0">
+            <a:schemeClr val="accent1"/>
+          </a:effectRef>
+          <a:fontRef idx="minor">
+            <a:schemeClr val="lt1"/>
+          </a:fontRef>
+        </p:style>
+        <p:txBody>
+          <a:bodyPr rtlCol="0" anchor="ctr"/>
+          <a:lstStyle/>
+          <a:p>
+            <a:pPr algn="ctr"/>
+            <a:r>
+              <a:rPr lang="en-US" altLang="ko-KR" sz="1100" dirty="0" err="1" smtClean="0"/>
+              <a:t>Modbus_register_t</a:t>
+            </a:r>
+            <a:endParaRPr lang="en-US" altLang="ko-KR" sz="1100" dirty="0" smtClean="0"/>
+          </a:p>
+        </p:txBody>
+      </p:sp>
+      <p:sp>
+        <p:nvSpPr>
+          <p:cNvPr id="6" name="직사각형 5"/>
+          <p:cNvSpPr/>
+          <p:nvPr/>
+        </p:nvSpPr>
+        <p:spPr>
+          <a:xfrm>
+            <a:off x="3907743" y="464633"/>
+            <a:ext cx="2686755" cy="626532"/>
+          </a:xfrm>
+          <a:prstGeom prst="rect">
+            <a:avLst/>
+          </a:prstGeom>
+        </p:spPr>
+        <p:style>
+          <a:lnRef idx="2">
+            <a:schemeClr val="accent1">
+              <a:shade val="50000"/>
+            </a:schemeClr>
+          </a:lnRef>
+          <a:fillRef idx="1">
+            <a:schemeClr val="accent1"/>
+          </a:fillRef>
+          <a:effectRef idx="0">
+            <a:schemeClr val="accent1"/>
+          </a:effectRef>
+          <a:fontRef idx="minor">
+            <a:schemeClr val="lt1"/>
+          </a:fontRef>
+        </p:style>
+        <p:txBody>
+          <a:bodyPr rtlCol="0" anchor="ctr"/>
+          <a:lstStyle/>
+          <a:p>
+            <a:pPr algn="ctr"/>
+            <a:r>
+              <a:rPr lang="en-US" altLang="ko-KR" sz="1100" dirty="0" smtClean="0"/>
+              <a:t>Core</a:t>
+            </a:r>
+            <a:endParaRPr lang="en-US" altLang="ko-KR" sz="1100" dirty="0" smtClean="0"/>
+          </a:p>
+        </p:txBody>
+      </p:sp>
+      <p:cxnSp>
+        <p:nvCxnSpPr>
+          <p:cNvPr id="18" name="구부러진 연결선 17"/>
+          <p:cNvCxnSpPr>
+            <a:stCxn id="6" idx="1"/>
+            <a:endCxn id="5" idx="1"/>
+          </p:cNvCxnSpPr>
+          <p:nvPr/>
+        </p:nvCxnSpPr>
+        <p:spPr>
+          <a:xfrm rot="10800000" flipH="1" flipV="1">
+            <a:off x="3907742" y="777898"/>
+            <a:ext cx="1" cy="2523893"/>
+          </a:xfrm>
+          <a:prstGeom prst="curvedConnector3">
+            <a:avLst>
+              <a:gd name="adj1" fmla="val -22860000000"/>
+            </a:avLst>
+          </a:prstGeom>
+          <a:ln>
+            <a:tailEnd type="triangle"/>
+          </a:ln>
+        </p:spPr>
+        <p:style>
+          <a:lnRef idx="1">
+            <a:schemeClr val="accent1"/>
+          </a:lnRef>
+          <a:fillRef idx="0">
+            <a:schemeClr val="accent1"/>
+          </a:fillRef>
+          <a:effectRef idx="0">
+            <a:schemeClr val="accent1"/>
+          </a:effectRef>
+          <a:fontRef idx="minor">
+            <a:schemeClr val="tx1"/>
+          </a:fontRef>
+        </p:style>
+      </p:cxnSp>
+      <p:sp>
+        <p:nvSpPr>
+          <p:cNvPr id="23" name="TextBox 22"/>
+          <p:cNvSpPr txBox="1"/>
+          <p:nvPr/>
+        </p:nvSpPr>
+        <p:spPr>
+          <a:xfrm>
+            <a:off x="2222752" y="1855178"/>
+            <a:ext cx="1651478" cy="369332"/>
+          </a:xfrm>
+          <a:prstGeom prst="rect">
+            <a:avLst/>
+          </a:prstGeom>
+          <a:noFill/>
+        </p:spPr>
+        <p:txBody>
+          <a:bodyPr wrap="none" rtlCol="0">
+            <a:spAutoFit/>
+          </a:bodyPr>
+          <a:lstStyle/>
+          <a:p>
+            <a:r>
+              <a:rPr lang="en-US" altLang="ko-KR" dirty="0" smtClean="0"/>
+              <a:t>Periodic Write</a:t>
+            </a:r>
+            <a:endParaRPr lang="ko-KR" altLang="en-US" dirty="0"/>
+          </a:p>
+        </p:txBody>
+      </p:sp>
+      <p:sp>
+        <p:nvSpPr>
+          <p:cNvPr id="31" name="TextBox 30"/>
+          <p:cNvSpPr txBox="1"/>
+          <p:nvPr/>
+        </p:nvSpPr>
+        <p:spPr>
+          <a:xfrm>
+            <a:off x="1862551" y="4633452"/>
+            <a:ext cx="1616596" cy="369332"/>
+          </a:xfrm>
+          <a:prstGeom prst="rect">
+            <a:avLst/>
+          </a:prstGeom>
+          <a:noFill/>
+        </p:spPr>
+        <p:txBody>
+          <a:bodyPr wrap="none" rtlCol="0">
+            <a:spAutoFit/>
+          </a:bodyPr>
+          <a:lstStyle/>
+          <a:p>
+            <a:r>
+              <a:rPr lang="en-US" altLang="ko-KR" dirty="0" smtClean="0"/>
+              <a:t>Read Request</a:t>
+            </a:r>
+            <a:endParaRPr lang="ko-KR" altLang="en-US" dirty="0"/>
+          </a:p>
+        </p:txBody>
+      </p:sp>
+      <p:sp>
+        <p:nvSpPr>
+          <p:cNvPr id="36" name="자유형 35"/>
+          <p:cNvSpPr/>
+          <p:nvPr/>
+        </p:nvSpPr>
+        <p:spPr>
+          <a:xfrm>
+            <a:off x="6594498" y="681254"/>
+            <a:ext cx="1237801" cy="2726964"/>
+          </a:xfrm>
+          <a:custGeom>
+            <a:avLst/>
+            <a:gdLst>
+              <a:gd name="connsiteX0" fmla="*/ 22302 w 1237801"/>
+              <a:gd name="connsiteY0" fmla="*/ 0 h 2620537"/>
+              <a:gd name="connsiteX1" fmla="*/ 1237785 w 1237801"/>
+              <a:gd name="connsiteY1" fmla="*/ 1683834 h 2620537"/>
+              <a:gd name="connsiteX2" fmla="*/ 0 w 1237801"/>
+              <a:gd name="connsiteY2" fmla="*/ 2620537 h 2620537"/>
+            </a:gdLst>
+            <a:ahLst/>
+            <a:cxnLst>
+              <a:cxn ang="0">
+                <a:pos x="connsiteX0" y="connsiteY0"/>
+              </a:cxn>
+              <a:cxn ang="0">
+                <a:pos x="connsiteX1" y="connsiteY1"/>
+              </a:cxn>
+              <a:cxn ang="0">
+                <a:pos x="connsiteX2" y="connsiteY2"/>
+              </a:cxn>
+            </a:cxnLst>
+            <a:rect l="l" t="t" r="r" b="b"/>
+            <a:pathLst>
+              <a:path w="1237801" h="2620537">
+                <a:moveTo>
+                  <a:pt x="22302" y="0"/>
+                </a:moveTo>
+                <a:cubicBezTo>
+                  <a:pt x="631902" y="623539"/>
+                  <a:pt x="1241502" y="1247078"/>
+                  <a:pt x="1237785" y="1683834"/>
+                </a:cubicBezTo>
+                <a:cubicBezTo>
+                  <a:pt x="1234068" y="2120590"/>
+                  <a:pt x="63190" y="2388220"/>
+                  <a:pt x="0" y="2620537"/>
+                </a:cubicBezTo>
+              </a:path>
+            </a:pathLst>
+          </a:custGeom>
+          <a:noFill/>
+          <a:ln>
+            <a:tailEnd type="triangle"/>
+          </a:ln>
+        </p:spPr>
+        <p:style>
+          <a:lnRef idx="2">
+            <a:schemeClr val="accent1">
+              <a:shade val="50000"/>
+            </a:schemeClr>
+          </a:lnRef>
+          <a:fillRef idx="1">
+            <a:schemeClr val="accent1"/>
+          </a:fillRef>
+          <a:effectRef idx="0">
+            <a:schemeClr val="accent1"/>
+          </a:effectRef>
+          <a:fontRef idx="minor">
+            <a:schemeClr val="lt1"/>
+          </a:fontRef>
+        </p:style>
+        <p:txBody>
+          <a:bodyPr rtlCol="0" anchor="ctr"/>
+          <a:lstStyle/>
+          <a:p>
+            <a:pPr algn="ctr"/>
+            <a:endParaRPr lang="ko-KR" altLang="en-US"/>
+          </a:p>
+        </p:txBody>
+      </p:sp>
+      <p:sp>
+        <p:nvSpPr>
+          <p:cNvPr id="37" name="TextBox 36"/>
+          <p:cNvSpPr txBox="1"/>
+          <p:nvPr/>
+        </p:nvSpPr>
+        <p:spPr>
+          <a:xfrm>
+            <a:off x="6266928" y="1966691"/>
+            <a:ext cx="1609543" cy="369332"/>
+          </a:xfrm>
+          <a:prstGeom prst="rect">
+            <a:avLst/>
+          </a:prstGeom>
+          <a:noFill/>
+        </p:spPr>
+        <p:txBody>
+          <a:bodyPr wrap="none" rtlCol="0">
+            <a:spAutoFit/>
+          </a:bodyPr>
+          <a:lstStyle/>
+          <a:p>
+            <a:r>
+              <a:rPr lang="en-US" altLang="ko-KR" dirty="0" smtClean="0"/>
+              <a:t>Periodic Read</a:t>
+            </a:r>
+            <a:endParaRPr lang="ko-KR" altLang="en-US" dirty="0"/>
+          </a:p>
+        </p:txBody>
+      </p:sp>
+      <p:sp>
+        <p:nvSpPr>
+          <p:cNvPr id="38" name="자유형 37"/>
+          <p:cNvSpPr/>
+          <p:nvPr/>
+        </p:nvSpPr>
+        <p:spPr>
+          <a:xfrm>
+            <a:off x="2670849" y="3560023"/>
+            <a:ext cx="1979740" cy="2175759"/>
+          </a:xfrm>
+          <a:custGeom>
+            <a:avLst/>
+            <a:gdLst>
+              <a:gd name="connsiteX0" fmla="*/ 294024 w 1979740"/>
+              <a:gd name="connsiteY0" fmla="*/ 2175759 h 2175759"/>
+              <a:gd name="connsiteX1" fmla="*/ 1596351 w 1979740"/>
+              <a:gd name="connsiteY1" fmla="*/ 1289068 h 2175759"/>
+              <a:gd name="connsiteX2" fmla="*/ 1970424 w 1979740"/>
+              <a:gd name="connsiteY2" fmla="*/ 97577 h 2175759"/>
+              <a:gd name="connsiteX3" fmla="*/ 1305406 w 1979740"/>
+              <a:gd name="connsiteY3" fmla="*/ 194559 h 2175759"/>
+              <a:gd name="connsiteX4" fmla="*/ 86206 w 1979740"/>
+              <a:gd name="connsiteY4" fmla="*/ 1192086 h 2175759"/>
+              <a:gd name="connsiteX5" fmla="*/ 197042 w 1979740"/>
+              <a:gd name="connsiteY5" fmla="*/ 2175759 h 2175759"/>
+            </a:gdLst>
+            <a:ahLst/>
+            <a:cxnLst>
+              <a:cxn ang="0">
+                <a:pos x="connsiteX0" y="connsiteY0"/>
+              </a:cxn>
+              <a:cxn ang="0">
+                <a:pos x="connsiteX1" y="connsiteY1"/>
+              </a:cxn>
+              <a:cxn ang="0">
+                <a:pos x="connsiteX2" y="connsiteY2"/>
+              </a:cxn>
+              <a:cxn ang="0">
+                <a:pos x="connsiteX3" y="connsiteY3"/>
+              </a:cxn>
+              <a:cxn ang="0">
+                <a:pos x="connsiteX4" y="connsiteY4"/>
+              </a:cxn>
+              <a:cxn ang="0">
+                <a:pos x="connsiteX5" y="connsiteY5"/>
+              </a:cxn>
+            </a:cxnLst>
+            <a:rect l="l" t="t" r="r" b="b"/>
+            <a:pathLst>
+              <a:path w="1979740" h="2175759">
+                <a:moveTo>
+                  <a:pt x="294024" y="2175759"/>
+                </a:moveTo>
+                <a:cubicBezTo>
+                  <a:pt x="805487" y="1905595"/>
+                  <a:pt x="1316951" y="1635432"/>
+                  <a:pt x="1596351" y="1289068"/>
+                </a:cubicBezTo>
+                <a:cubicBezTo>
+                  <a:pt x="1875751" y="942704"/>
+                  <a:pt x="2018915" y="279995"/>
+                  <a:pt x="1970424" y="97577"/>
+                </a:cubicBezTo>
+                <a:cubicBezTo>
+                  <a:pt x="1921933" y="-84841"/>
+                  <a:pt x="1619442" y="12141"/>
+                  <a:pt x="1305406" y="194559"/>
+                </a:cubicBezTo>
+                <a:cubicBezTo>
+                  <a:pt x="991370" y="376977"/>
+                  <a:pt x="270933" y="861886"/>
+                  <a:pt x="86206" y="1192086"/>
+                </a:cubicBezTo>
+                <a:cubicBezTo>
+                  <a:pt x="-98521" y="1522286"/>
+                  <a:pt x="49260" y="1849022"/>
+                  <a:pt x="197042" y="2175759"/>
+                </a:cubicBezTo>
+              </a:path>
+            </a:pathLst>
+          </a:custGeom>
+          <a:noFill/>
+          <a:ln>
+            <a:tailEnd type="triangle"/>
+          </a:ln>
+        </p:spPr>
+        <p:style>
+          <a:lnRef idx="2">
+            <a:schemeClr val="accent1">
+              <a:shade val="50000"/>
+            </a:schemeClr>
+          </a:lnRef>
+          <a:fillRef idx="1">
+            <a:schemeClr val="accent1"/>
+          </a:fillRef>
+          <a:effectRef idx="0">
+            <a:schemeClr val="accent1"/>
+          </a:effectRef>
+          <a:fontRef idx="minor">
+            <a:schemeClr val="lt1"/>
+          </a:fontRef>
+        </p:style>
+        <p:txBody>
+          <a:bodyPr rtlCol="0" anchor="ctr"/>
+          <a:lstStyle/>
+          <a:p>
+            <a:pPr algn="ctr"/>
+            <a:endParaRPr lang="ko-KR" altLang="en-US"/>
+          </a:p>
+        </p:txBody>
+      </p:sp>
+      <p:sp>
+        <p:nvSpPr>
+          <p:cNvPr id="39" name="자유형 38"/>
+          <p:cNvSpPr/>
+          <p:nvPr/>
+        </p:nvSpPr>
+        <p:spPr>
+          <a:xfrm>
+            <a:off x="4275317" y="3544583"/>
+            <a:ext cx="2457036" cy="2509853"/>
+          </a:xfrm>
+          <a:custGeom>
+            <a:avLst/>
+            <a:gdLst>
+              <a:gd name="connsiteX0" fmla="*/ 158138 w 2457036"/>
+              <a:gd name="connsiteY0" fmla="*/ 2509853 h 2509853"/>
+              <a:gd name="connsiteX1" fmla="*/ 1709847 w 2457036"/>
+              <a:gd name="connsiteY1" fmla="*/ 2038799 h 2509853"/>
+              <a:gd name="connsiteX2" fmla="*/ 2444138 w 2457036"/>
+              <a:gd name="connsiteY2" fmla="*/ 958144 h 2509853"/>
+              <a:gd name="connsiteX3" fmla="*/ 2153192 w 2457036"/>
+              <a:gd name="connsiteY3" fmla="*/ 182290 h 2509853"/>
+              <a:gd name="connsiteX4" fmla="*/ 1834538 w 2457036"/>
+              <a:gd name="connsiteY4" fmla="*/ 57599 h 2509853"/>
+              <a:gd name="connsiteX5" fmla="*/ 850865 w 2457036"/>
+              <a:gd name="connsiteY5" fmla="*/ 944290 h 2509853"/>
+              <a:gd name="connsiteX6" fmla="*/ 102719 w 2457036"/>
+              <a:gd name="connsiteY6" fmla="*/ 2038799 h 2509853"/>
+              <a:gd name="connsiteX7" fmla="*/ 5738 w 2457036"/>
+              <a:gd name="connsiteY7" fmla="*/ 2163490 h 2509853"/>
+              <a:gd name="connsiteX8" fmla="*/ 19592 w 2457036"/>
+              <a:gd name="connsiteY8" fmla="*/ 2232762 h 2509853"/>
+            </a:gdLst>
+            <a:ahLst/>
+            <a:cxnLst>
+              <a:cxn ang="0">
+                <a:pos x="connsiteX0" y="connsiteY0"/>
+              </a:cxn>
+              <a:cxn ang="0">
+                <a:pos x="connsiteX1" y="connsiteY1"/>
+              </a:cxn>
+              <a:cxn ang="0">
+                <a:pos x="connsiteX2" y="connsiteY2"/>
+              </a:cxn>
+              <a:cxn ang="0">
+                <a:pos x="connsiteX3" y="connsiteY3"/>
+              </a:cxn>
+              <a:cxn ang="0">
+                <a:pos x="connsiteX4" y="connsiteY4"/>
+              </a:cxn>
+              <a:cxn ang="0">
+                <a:pos x="connsiteX5" y="connsiteY5"/>
+              </a:cxn>
+              <a:cxn ang="0">
+                <a:pos x="connsiteX6" y="connsiteY6"/>
+              </a:cxn>
+              <a:cxn ang="0">
+                <a:pos x="connsiteX7" y="connsiteY7"/>
+              </a:cxn>
+              <a:cxn ang="0">
+                <a:pos x="connsiteX8" y="connsiteY8"/>
+              </a:cxn>
+            </a:cxnLst>
+            <a:rect l="l" t="t" r="r" b="b"/>
+            <a:pathLst>
+              <a:path w="2457036" h="2509853">
+                <a:moveTo>
+                  <a:pt x="158138" y="2509853"/>
+                </a:moveTo>
+                <a:cubicBezTo>
+                  <a:pt x="743492" y="2403635"/>
+                  <a:pt x="1328847" y="2297417"/>
+                  <a:pt x="1709847" y="2038799"/>
+                </a:cubicBezTo>
+                <a:cubicBezTo>
+                  <a:pt x="2090847" y="1780181"/>
+                  <a:pt x="2370247" y="1267562"/>
+                  <a:pt x="2444138" y="958144"/>
+                </a:cubicBezTo>
+                <a:cubicBezTo>
+                  <a:pt x="2518029" y="648726"/>
+                  <a:pt x="2254792" y="332381"/>
+                  <a:pt x="2153192" y="182290"/>
+                </a:cubicBezTo>
+                <a:cubicBezTo>
+                  <a:pt x="2051592" y="32199"/>
+                  <a:pt x="2051593" y="-69401"/>
+                  <a:pt x="1834538" y="57599"/>
+                </a:cubicBezTo>
+                <a:cubicBezTo>
+                  <a:pt x="1617484" y="184599"/>
+                  <a:pt x="1139501" y="614090"/>
+                  <a:pt x="850865" y="944290"/>
+                </a:cubicBezTo>
+                <a:cubicBezTo>
+                  <a:pt x="562229" y="1274490"/>
+                  <a:pt x="243573" y="1835599"/>
+                  <a:pt x="102719" y="2038799"/>
+                </a:cubicBezTo>
+                <a:cubicBezTo>
+                  <a:pt x="-38135" y="2241999"/>
+                  <a:pt x="19592" y="2131163"/>
+                  <a:pt x="5738" y="2163490"/>
+                </a:cubicBezTo>
+                <a:cubicBezTo>
+                  <a:pt x="-8116" y="2195817"/>
+                  <a:pt x="5738" y="2214289"/>
+                  <a:pt x="19592" y="2232762"/>
+                </a:cubicBezTo>
+              </a:path>
+            </a:pathLst>
+          </a:custGeom>
+          <a:noFill/>
+          <a:ln>
+            <a:tailEnd type="triangle"/>
+          </a:ln>
+        </p:spPr>
+        <p:style>
+          <a:lnRef idx="2">
+            <a:schemeClr val="accent1">
+              <a:shade val="50000"/>
+            </a:schemeClr>
+          </a:lnRef>
+          <a:fillRef idx="1">
+            <a:schemeClr val="accent1"/>
+          </a:fillRef>
+          <a:effectRef idx="0">
+            <a:schemeClr val="accent1"/>
+          </a:effectRef>
+          <a:fontRef idx="minor">
+            <a:schemeClr val="lt1"/>
+          </a:fontRef>
+        </p:style>
+        <p:txBody>
+          <a:bodyPr rtlCol="0" anchor="ctr"/>
+          <a:lstStyle/>
+          <a:p>
+            <a:pPr algn="ctr"/>
+            <a:endParaRPr lang="ko-KR" altLang="en-US"/>
+          </a:p>
+        </p:txBody>
+      </p:sp>
+      <p:sp>
+        <p:nvSpPr>
+          <p:cNvPr id="40" name="TextBox 39"/>
+          <p:cNvSpPr txBox="1"/>
+          <p:nvPr/>
+        </p:nvSpPr>
+        <p:spPr>
+          <a:xfrm>
+            <a:off x="4827806" y="5327753"/>
+            <a:ext cx="1658531" cy="369332"/>
+          </a:xfrm>
+          <a:prstGeom prst="rect">
+            <a:avLst/>
+          </a:prstGeom>
+          <a:noFill/>
+        </p:spPr>
+        <p:txBody>
+          <a:bodyPr wrap="none" rtlCol="0">
+            <a:spAutoFit/>
+          </a:bodyPr>
+          <a:lstStyle/>
+          <a:p>
+            <a:r>
+              <a:rPr lang="en-US" altLang="ko-KR" dirty="0" smtClean="0"/>
+              <a:t>Write Request</a:t>
+            </a:r>
+            <a:endParaRPr lang="ko-KR" altLang="en-US" dirty="0"/>
+          </a:p>
+        </p:txBody>
+      </p:sp>
+    </p:spTree>
+    <p:extLst>
+      <p:ext uri="{BB962C8B-B14F-4D97-AF65-F5344CB8AC3E}">
+        <p14:creationId xmlns:p14="http://schemas.microsoft.com/office/powerpoint/2010/main" val="943275634"/>
+      </p:ext>
+    </p:extLst>
+  </p:cSld>
+  <p:clrMapOvr>
+    <a:masterClrMapping/>
+  </p:clrMapOvr>
+</p:sld>
+</file>
+
+<file path=ppt/slides/slide4.xml><?xml version="1.0" encoding="utf-8"?>
+<p:sld xmlns:a="http://schemas.openxmlformats.org/drawingml/2006/main" xmlns:r="http://schemas.openxmlformats.org/officeDocument/2006/relationships" xmlns:p="http://schemas.openxmlformats.org/presentationml/2006/main">
+  <p:cSld>
+    <p:spTree>
+      <p:nvGrpSpPr>
+        <p:cNvPr id="1" name=""/>
+        <p:cNvGrpSpPr/>
+        <p:nvPr/>
+      </p:nvGrpSpPr>
+      <p:grpSpPr>
+        <a:xfrm>
+          <a:off x="0" y="0"/>
+          <a:ext cx="0" cy="0"/>
+          <a:chOff x="0" y="0"/>
+          <a:chExt cx="0" cy="0"/>
+        </a:xfrm>
+      </p:grpSpPr>
+      <p:sp>
+        <p:nvSpPr>
+          <p:cNvPr id="18" name="타원 17"/>
+          <p:cNvSpPr/>
+          <p:nvPr/>
+        </p:nvSpPr>
+        <p:spPr>
+          <a:xfrm>
+            <a:off x="601579" y="4588268"/>
+            <a:ext cx="9914021" cy="1884356"/>
+          </a:xfrm>
+          <a:prstGeom prst="ellipse">
+            <a:avLst/>
+          </a:prstGeom>
+        </p:spPr>
+        <p:style>
+          <a:lnRef idx="2">
+            <a:schemeClr val="accent4"/>
+          </a:lnRef>
+          <a:fillRef idx="1">
+            <a:schemeClr val="lt1"/>
+          </a:fillRef>
+          <a:effectRef idx="0">
+            <a:schemeClr val="accent4"/>
+          </a:effectRef>
+          <a:fontRef idx="minor">
+            <a:schemeClr val="dk1"/>
+          </a:fontRef>
+        </p:style>
+        <p:txBody>
+          <a:bodyPr rtlCol="0" anchor="ctr"/>
+          <a:lstStyle/>
+          <a:p>
+            <a:pPr algn="ctr"/>
+            <a:endParaRPr lang="ko-KR" altLang="en-US"/>
+          </a:p>
+        </p:txBody>
+      </p:sp>
+      <p:sp>
+        <p:nvSpPr>
+          <p:cNvPr id="14" name="타원 13"/>
+          <p:cNvSpPr/>
+          <p:nvPr/>
+        </p:nvSpPr>
+        <p:spPr>
+          <a:xfrm>
+            <a:off x="601579" y="1972598"/>
+            <a:ext cx="9914021" cy="1884356"/>
+          </a:xfrm>
+          <a:prstGeom prst="ellipse">
+            <a:avLst/>
+          </a:prstGeom>
+        </p:spPr>
+        <p:style>
+          <a:lnRef idx="2">
+            <a:schemeClr val="accent4"/>
+          </a:lnRef>
+          <a:fillRef idx="1">
+            <a:schemeClr val="lt1"/>
+          </a:fillRef>
+          <a:effectRef idx="0">
+            <a:schemeClr val="accent4"/>
+          </a:effectRef>
+          <a:fontRef idx="minor">
+            <a:schemeClr val="dk1"/>
+          </a:fontRef>
+        </p:style>
+        <p:txBody>
+          <a:bodyPr rtlCol="0" anchor="ctr"/>
+          <a:lstStyle/>
+          <a:p>
+            <a:pPr algn="ctr"/>
+            <a:endParaRPr lang="ko-KR" altLang="en-US"/>
+          </a:p>
+        </p:txBody>
+      </p:sp>
+      <p:sp>
+        <p:nvSpPr>
+          <p:cNvPr id="5" name="직사각형 4"/>
+          <p:cNvSpPr/>
+          <p:nvPr/>
+        </p:nvSpPr>
+        <p:spPr>
+          <a:xfrm>
+            <a:off x="3990871" y="949543"/>
+            <a:ext cx="2686755" cy="626532"/>
+          </a:xfrm>
+          <a:prstGeom prst="rect">
+            <a:avLst/>
+          </a:prstGeom>
+        </p:spPr>
+        <p:style>
+          <a:lnRef idx="2">
+            <a:schemeClr val="accent1">
+              <a:shade val="50000"/>
+            </a:schemeClr>
+          </a:lnRef>
+          <a:fillRef idx="1">
+            <a:schemeClr val="accent1"/>
+          </a:fillRef>
+          <a:effectRef idx="0">
+            <a:schemeClr val="accent1"/>
+          </a:effectRef>
+          <a:fontRef idx="minor">
+            <a:schemeClr val="lt1"/>
+          </a:fontRef>
+        </p:style>
+        <p:txBody>
+          <a:bodyPr rtlCol="0" anchor="ctr"/>
+          <a:lstStyle/>
+          <a:p>
+            <a:pPr algn="ctr"/>
+            <a:r>
+              <a:rPr lang="en-US" altLang="ko-KR" sz="1100" dirty="0" smtClean="0"/>
+              <a:t>Core</a:t>
+            </a:r>
+            <a:endParaRPr lang="en-US" altLang="ko-KR" sz="1100" dirty="0" smtClean="0"/>
+          </a:p>
+        </p:txBody>
+      </p:sp>
+      <p:sp>
+        <p:nvSpPr>
+          <p:cNvPr id="6" name="직사각형 5"/>
+          <p:cNvSpPr/>
+          <p:nvPr/>
+        </p:nvSpPr>
+        <p:spPr>
+          <a:xfrm>
+            <a:off x="1649453" y="2542816"/>
+            <a:ext cx="2686755" cy="1073220"/>
+          </a:xfrm>
+          <a:prstGeom prst="rect">
+            <a:avLst/>
+          </a:prstGeom>
+        </p:spPr>
+        <p:style>
+          <a:lnRef idx="2">
+            <a:schemeClr val="accent1">
+              <a:shade val="50000"/>
+            </a:schemeClr>
+          </a:lnRef>
+          <a:fillRef idx="1">
+            <a:schemeClr val="accent1"/>
+          </a:fillRef>
+          <a:effectRef idx="0">
+            <a:schemeClr val="accent1"/>
+          </a:effectRef>
+          <a:fontRef idx="minor">
+            <a:schemeClr val="lt1"/>
+          </a:fontRef>
+        </p:style>
+        <p:txBody>
+          <a:bodyPr rtlCol="0" anchor="ctr"/>
+          <a:lstStyle/>
+          <a:p>
+            <a:pPr algn="ctr"/>
+            <a:r>
+              <a:rPr lang="en-US" altLang="ko-KR" sz="1100" dirty="0" smtClean="0"/>
+              <a:t>IO_DRIVER_IF</a:t>
+            </a:r>
+          </a:p>
+          <a:p>
+            <a:pPr algn="ctr"/>
+            <a:endParaRPr lang="en-US" altLang="ko-KR" sz="1100" dirty="0"/>
+          </a:p>
+          <a:p>
+            <a:pPr algn="ctr"/>
+            <a:r>
+              <a:rPr lang="en-US" altLang="ko-KR" sz="1100" dirty="0" smtClean="0"/>
+              <a:t>v = </a:t>
+            </a:r>
+            <a:r>
+              <a:rPr lang="en-US" altLang="ko-KR" sz="1100" dirty="0" err="1" smtClean="0"/>
+              <a:t>get_value</a:t>
+            </a:r>
+            <a:r>
+              <a:rPr lang="en-US" altLang="ko-KR" sz="1100" dirty="0" smtClean="0"/>
+              <a:t>(</a:t>
+            </a:r>
+            <a:r>
+              <a:rPr lang="en-US" altLang="ko-KR" sz="1100" dirty="0" err="1" smtClean="0"/>
+              <a:t>io_chnl</a:t>
+            </a:r>
+            <a:r>
+              <a:rPr lang="en-US" altLang="ko-KR" sz="1100" dirty="0" smtClean="0"/>
+              <a:t>)</a:t>
+            </a:r>
+          </a:p>
+          <a:p>
+            <a:pPr algn="ctr"/>
+            <a:r>
+              <a:rPr lang="en-US" altLang="ko-KR" sz="1100" dirty="0" err="1" smtClean="0"/>
+              <a:t>set_value</a:t>
+            </a:r>
+            <a:r>
+              <a:rPr lang="en-US" altLang="ko-KR" sz="1100" dirty="0" smtClean="0"/>
+              <a:t>(</a:t>
+            </a:r>
+            <a:r>
+              <a:rPr lang="en-US" altLang="ko-KR" sz="1100" dirty="0" err="1" smtClean="0"/>
+              <a:t>io_chnl</a:t>
+            </a:r>
+            <a:r>
+              <a:rPr lang="en-US" altLang="ko-KR" sz="1100" dirty="0" smtClean="0"/>
+              <a:t>, v)</a:t>
+            </a:r>
+            <a:endParaRPr lang="en-US" altLang="ko-KR" sz="1100" dirty="0" smtClean="0"/>
+          </a:p>
+        </p:txBody>
+      </p:sp>
+      <p:sp>
+        <p:nvSpPr>
+          <p:cNvPr id="7" name="직사각형 6"/>
+          <p:cNvSpPr/>
+          <p:nvPr/>
+        </p:nvSpPr>
+        <p:spPr>
+          <a:xfrm>
+            <a:off x="1649452" y="5399404"/>
+            <a:ext cx="2686755" cy="640448"/>
+          </a:xfrm>
+          <a:prstGeom prst="rect">
+            <a:avLst/>
+          </a:prstGeom>
+        </p:spPr>
+        <p:style>
+          <a:lnRef idx="2">
+            <a:schemeClr val="accent1">
+              <a:shade val="50000"/>
+            </a:schemeClr>
+          </a:lnRef>
+          <a:fillRef idx="1">
+            <a:schemeClr val="accent1"/>
+          </a:fillRef>
+          <a:effectRef idx="0">
+            <a:schemeClr val="accent1"/>
+          </a:effectRef>
+          <a:fontRef idx="minor">
+            <a:schemeClr val="lt1"/>
+          </a:fontRef>
+        </p:style>
+        <p:txBody>
+          <a:bodyPr rtlCol="0" anchor="ctr"/>
+          <a:lstStyle/>
+          <a:p>
+            <a:pPr algn="ctr"/>
+            <a:r>
+              <a:rPr lang="en-US" altLang="ko-KR" sz="1100" dirty="0" smtClean="0"/>
+              <a:t>Modbus Slave</a:t>
+            </a:r>
+            <a:endParaRPr lang="en-US" altLang="ko-KR" sz="1100" dirty="0" smtClean="0"/>
+          </a:p>
+        </p:txBody>
+      </p:sp>
+      <p:cxnSp>
+        <p:nvCxnSpPr>
+          <p:cNvPr id="9" name="직선 화살표 연결선 8"/>
+          <p:cNvCxnSpPr>
+            <a:stCxn id="5" idx="2"/>
+            <a:endCxn id="6" idx="0"/>
+          </p:cNvCxnSpPr>
+          <p:nvPr/>
+        </p:nvCxnSpPr>
+        <p:spPr>
+          <a:xfrm flipH="1">
+            <a:off x="2992831" y="1576075"/>
+            <a:ext cx="2341418" cy="966741"/>
+          </a:xfrm>
+          <a:prstGeom prst="straightConnector1">
+            <a:avLst/>
+          </a:prstGeom>
+          <a:ln>
+            <a:tailEnd type="triangle"/>
+          </a:ln>
+        </p:spPr>
+        <p:style>
+          <a:lnRef idx="1">
+            <a:schemeClr val="accent1"/>
+          </a:lnRef>
+          <a:fillRef idx="0">
+            <a:schemeClr val="accent1"/>
+          </a:fillRef>
+          <a:effectRef idx="0">
+            <a:schemeClr val="accent1"/>
+          </a:effectRef>
+          <a:fontRef idx="minor">
+            <a:schemeClr val="tx1"/>
+          </a:fontRef>
+        </p:style>
+      </p:cxnSp>
+      <p:cxnSp>
+        <p:nvCxnSpPr>
+          <p:cNvPr id="11" name="직선 화살표 연결선 10"/>
+          <p:cNvCxnSpPr>
+            <a:stCxn id="6" idx="2"/>
+            <a:endCxn id="7" idx="0"/>
+          </p:cNvCxnSpPr>
+          <p:nvPr/>
+        </p:nvCxnSpPr>
+        <p:spPr>
+          <a:xfrm flipH="1">
+            <a:off x="2992830" y="3616036"/>
+            <a:ext cx="1" cy="1783368"/>
+          </a:xfrm>
+          <a:prstGeom prst="straightConnector1">
+            <a:avLst/>
+          </a:prstGeom>
+          <a:ln>
+            <a:tailEnd type="triangle"/>
+          </a:ln>
+        </p:spPr>
+        <p:style>
+          <a:lnRef idx="1">
+            <a:schemeClr val="accent1"/>
+          </a:lnRef>
+          <a:fillRef idx="0">
+            <a:schemeClr val="accent1"/>
+          </a:fillRef>
+          <a:effectRef idx="0">
+            <a:schemeClr val="accent1"/>
+          </a:effectRef>
+          <a:fontRef idx="minor">
+            <a:schemeClr val="tx1"/>
+          </a:fontRef>
+        </p:style>
+      </p:cxnSp>
+      <p:sp>
+        <p:nvSpPr>
+          <p:cNvPr id="15" name="TextBox 14"/>
+          <p:cNvSpPr txBox="1"/>
+          <p:nvPr/>
+        </p:nvSpPr>
+        <p:spPr>
+          <a:xfrm>
+            <a:off x="6858000" y="2542816"/>
+            <a:ext cx="2418347" cy="646331"/>
+          </a:xfrm>
+          <a:prstGeom prst="rect">
+            <a:avLst/>
+          </a:prstGeom>
+          <a:noFill/>
+        </p:spPr>
+        <p:txBody>
+          <a:bodyPr wrap="square" rtlCol="0">
+            <a:spAutoFit/>
+          </a:bodyPr>
+          <a:lstStyle/>
+          <a:p>
+            <a:r>
+              <a:rPr lang="en-US" altLang="ko-KR" dirty="0" smtClean="0"/>
+              <a:t>IO Driver get/set abstraction layer</a:t>
+            </a:r>
+            <a:endParaRPr lang="ko-KR" altLang="en-US" dirty="0"/>
+          </a:p>
+        </p:txBody>
+      </p:sp>
+      <p:sp>
+        <p:nvSpPr>
+          <p:cNvPr id="19" name="TextBox 18"/>
+          <p:cNvSpPr txBox="1"/>
+          <p:nvPr/>
+        </p:nvSpPr>
+        <p:spPr>
+          <a:xfrm>
+            <a:off x="6857999" y="5207280"/>
+            <a:ext cx="2418347" cy="646331"/>
+          </a:xfrm>
+          <a:prstGeom prst="rect">
+            <a:avLst/>
+          </a:prstGeom>
+          <a:noFill/>
+        </p:spPr>
+        <p:txBody>
+          <a:bodyPr wrap="square" rtlCol="0">
+            <a:spAutoFit/>
+          </a:bodyPr>
+          <a:lstStyle/>
+          <a:p>
+            <a:r>
+              <a:rPr lang="en-US" altLang="ko-KR" dirty="0" smtClean="0"/>
+              <a:t>Actual driver &amp; registers</a:t>
+            </a:r>
+            <a:endParaRPr lang="ko-KR" altLang="en-US" dirty="0"/>
+          </a:p>
+        </p:txBody>
+      </p:sp>
+    </p:spTree>
+    <p:extLst>
+      <p:ext uri="{BB962C8B-B14F-4D97-AF65-F5344CB8AC3E}">
+        <p14:creationId xmlns:p14="http://schemas.microsoft.com/office/powerpoint/2010/main" val="3502482717"/>
+      </p:ext>
+    </p:extLst>
+  </p:cSld>
+  <p:clrMapOvr>
+    <a:masterClrMapping/>
+  </p:clrMapOvr>
+</p:sld>
+</file>
+
+<file path=ppt/slides/slide5.xml><?xml version="1.0" encoding="utf-8"?>
+<p:sld xmlns:a="http://schemas.openxmlformats.org/drawingml/2006/main" xmlns:r="http://schemas.openxmlformats.org/officeDocument/2006/relationships" xmlns:p="http://schemas.openxmlformats.org/presentationml/2006/main">
+  <p:cSld>
+    <p:spTree>
+      <p:nvGrpSpPr>
+        <p:cNvPr id="1" name=""/>
+        <p:cNvGrpSpPr/>
+        <p:nvPr/>
+      </p:nvGrpSpPr>
+      <p:grpSpPr>
+        <a:xfrm>
+          <a:off x="0" y="0"/>
+          <a:ext cx="0" cy="0"/>
+          <a:chOff x="0" y="0"/>
+          <a:chExt cx="0" cy="0"/>
+        </a:xfrm>
+      </p:grpSpPr>
+      <p:sp>
+        <p:nvSpPr>
+          <p:cNvPr id="4" name="TextBox 3"/>
+          <p:cNvSpPr txBox="1"/>
+          <p:nvPr/>
+        </p:nvSpPr>
+        <p:spPr>
+          <a:xfrm>
+            <a:off x="2863517" y="409075"/>
+            <a:ext cx="720197" cy="369332"/>
+          </a:xfrm>
+          <a:prstGeom prst="rect">
+            <a:avLst/>
+          </a:prstGeom>
+          <a:noFill/>
+        </p:spPr>
+        <p:txBody>
+          <a:bodyPr wrap="none" rtlCol="0">
+            <a:spAutoFit/>
+          </a:bodyPr>
+          <a:lstStyle/>
+          <a:p>
+            <a:r>
+              <a:rPr lang="en-US" altLang="ko-KR" dirty="0" smtClean="0"/>
+              <a:t>Slave</a:t>
+            </a:r>
+            <a:endParaRPr lang="ko-KR" altLang="en-US" dirty="0"/>
+          </a:p>
+        </p:txBody>
+      </p:sp>
+      <p:sp>
+        <p:nvSpPr>
+          <p:cNvPr id="5" name="TextBox 4"/>
+          <p:cNvSpPr txBox="1"/>
+          <p:nvPr/>
+        </p:nvSpPr>
+        <p:spPr>
+          <a:xfrm>
+            <a:off x="4844717" y="409075"/>
+            <a:ext cx="899285" cy="369332"/>
+          </a:xfrm>
+          <a:prstGeom prst="rect">
+            <a:avLst/>
+          </a:prstGeom>
+          <a:noFill/>
+        </p:spPr>
+        <p:txBody>
+          <a:bodyPr wrap="none" rtlCol="0">
+            <a:spAutoFit/>
+          </a:bodyPr>
+          <a:lstStyle/>
+          <a:p>
+            <a:r>
+              <a:rPr lang="en-US" altLang="ko-KR" dirty="0" smtClean="0"/>
+              <a:t>Master</a:t>
+            </a:r>
+            <a:endParaRPr lang="ko-KR" altLang="en-US" dirty="0"/>
+          </a:p>
+        </p:txBody>
+      </p:sp>
+      <p:sp>
+        <p:nvSpPr>
+          <p:cNvPr id="6" name="TextBox 5"/>
+          <p:cNvSpPr txBox="1"/>
+          <p:nvPr/>
+        </p:nvSpPr>
+        <p:spPr>
+          <a:xfrm>
+            <a:off x="7415465" y="409075"/>
+            <a:ext cx="670312" cy="369332"/>
+          </a:xfrm>
+          <a:prstGeom prst="rect">
+            <a:avLst/>
+          </a:prstGeom>
+          <a:noFill/>
+        </p:spPr>
+        <p:txBody>
+          <a:bodyPr wrap="none" rtlCol="0">
+            <a:spAutoFit/>
+          </a:bodyPr>
+          <a:lstStyle/>
+          <a:p>
+            <a:r>
+              <a:rPr lang="en-US" altLang="ko-KR" dirty="0" smtClean="0"/>
+              <a:t>Core</a:t>
+            </a:r>
+            <a:endParaRPr lang="ko-KR" altLang="en-US" dirty="0"/>
+          </a:p>
+        </p:txBody>
+      </p:sp>
+      <p:cxnSp>
+        <p:nvCxnSpPr>
+          <p:cNvPr id="8" name="직선 연결선 7"/>
+          <p:cNvCxnSpPr>
+            <a:stCxn id="4" idx="2"/>
+          </p:cNvCxnSpPr>
+          <p:nvPr/>
+        </p:nvCxnSpPr>
+        <p:spPr>
+          <a:xfrm flipH="1">
+            <a:off x="3223615" y="778407"/>
+            <a:ext cx="1" cy="5309572"/>
+          </a:xfrm>
+          <a:prstGeom prst="line">
+            <a:avLst/>
+          </a:prstGeom>
+        </p:spPr>
+        <p:style>
+          <a:lnRef idx="1">
+            <a:schemeClr val="accent1"/>
+          </a:lnRef>
+          <a:fillRef idx="0">
+            <a:schemeClr val="accent1"/>
+          </a:fillRef>
+          <a:effectRef idx="0">
+            <a:schemeClr val="accent1"/>
+          </a:effectRef>
+          <a:fontRef idx="minor">
+            <a:schemeClr val="tx1"/>
+          </a:fontRef>
+        </p:style>
+      </p:cxnSp>
+      <p:cxnSp>
+        <p:nvCxnSpPr>
+          <p:cNvPr id="10" name="직선 연결선 9"/>
+          <p:cNvCxnSpPr>
+            <a:stCxn id="5" idx="2"/>
+          </p:cNvCxnSpPr>
+          <p:nvPr/>
+        </p:nvCxnSpPr>
+        <p:spPr>
+          <a:xfrm flipH="1">
+            <a:off x="5294359" y="778407"/>
+            <a:ext cx="1" cy="5309572"/>
+          </a:xfrm>
+          <a:prstGeom prst="line">
+            <a:avLst/>
+          </a:prstGeom>
+        </p:spPr>
+        <p:style>
+          <a:lnRef idx="1">
+            <a:schemeClr val="accent1"/>
+          </a:lnRef>
+          <a:fillRef idx="0">
+            <a:schemeClr val="accent1"/>
+          </a:fillRef>
+          <a:effectRef idx="0">
+            <a:schemeClr val="accent1"/>
+          </a:effectRef>
+          <a:fontRef idx="minor">
+            <a:schemeClr val="tx1"/>
+          </a:fontRef>
+        </p:style>
+      </p:cxnSp>
+      <p:cxnSp>
+        <p:nvCxnSpPr>
+          <p:cNvPr id="12" name="직선 연결선 11"/>
+          <p:cNvCxnSpPr>
+            <a:stCxn id="6" idx="2"/>
+          </p:cNvCxnSpPr>
+          <p:nvPr/>
+        </p:nvCxnSpPr>
+        <p:spPr>
+          <a:xfrm>
+            <a:off x="7750621" y="778407"/>
+            <a:ext cx="0" cy="5393793"/>
+          </a:xfrm>
+          <a:prstGeom prst="line">
+            <a:avLst/>
+          </a:prstGeom>
+        </p:spPr>
+        <p:style>
+          <a:lnRef idx="1">
+            <a:schemeClr val="accent1"/>
+          </a:lnRef>
+          <a:fillRef idx="0">
+            <a:schemeClr val="accent1"/>
+          </a:fillRef>
+          <a:effectRef idx="0">
+            <a:schemeClr val="accent1"/>
+          </a:effectRef>
+          <a:fontRef idx="minor">
+            <a:schemeClr val="tx1"/>
+          </a:fontRef>
+        </p:style>
+      </p:cxnSp>
+      <p:cxnSp>
+        <p:nvCxnSpPr>
+          <p:cNvPr id="14" name="직선 화살표 연결선 13"/>
+          <p:cNvCxnSpPr/>
+          <p:nvPr/>
+        </p:nvCxnSpPr>
+        <p:spPr>
+          <a:xfrm>
+            <a:off x="782053" y="1323474"/>
+            <a:ext cx="2454442" cy="0"/>
+          </a:xfrm>
+          <a:prstGeom prst="straightConnector1">
+            <a:avLst/>
+          </a:prstGeom>
+          <a:ln>
+            <a:tailEnd type="triangle"/>
+          </a:ln>
+        </p:spPr>
+        <p:style>
+          <a:lnRef idx="1">
+            <a:schemeClr val="accent1"/>
+          </a:lnRef>
+          <a:fillRef idx="0">
+            <a:schemeClr val="accent1"/>
+          </a:fillRef>
+          <a:effectRef idx="0">
+            <a:schemeClr val="accent1"/>
+          </a:effectRef>
+          <a:fontRef idx="minor">
+            <a:schemeClr val="tx1"/>
+          </a:fontRef>
+        </p:style>
+      </p:cxnSp>
+      <p:sp>
+        <p:nvSpPr>
+          <p:cNvPr id="15" name="TextBox 14"/>
+          <p:cNvSpPr txBox="1"/>
+          <p:nvPr/>
+        </p:nvSpPr>
+        <p:spPr>
+          <a:xfrm>
+            <a:off x="1151175" y="954142"/>
+            <a:ext cx="1124988" cy="369332"/>
+          </a:xfrm>
+          <a:prstGeom prst="rect">
+            <a:avLst/>
+          </a:prstGeom>
+          <a:noFill/>
+        </p:spPr>
+        <p:txBody>
+          <a:bodyPr wrap="none" rtlCol="0">
+            <a:spAutoFit/>
+          </a:bodyPr>
+          <a:lstStyle/>
+          <a:p>
+            <a:r>
+              <a:rPr lang="en-US" altLang="ko-KR" dirty="0" smtClean="0"/>
+              <a:t>Read </a:t>
+            </a:r>
+            <a:r>
+              <a:rPr lang="en-US" altLang="ko-KR" dirty="0" err="1" smtClean="0"/>
+              <a:t>req</a:t>
+            </a:r>
+            <a:endParaRPr lang="ko-KR" altLang="en-US" dirty="0"/>
+          </a:p>
+        </p:txBody>
+      </p:sp>
+      <p:cxnSp>
+        <p:nvCxnSpPr>
+          <p:cNvPr id="17" name="직선 화살표 연결선 16"/>
+          <p:cNvCxnSpPr/>
+          <p:nvPr/>
+        </p:nvCxnSpPr>
+        <p:spPr>
+          <a:xfrm>
+            <a:off x="3236495" y="1503947"/>
+            <a:ext cx="4514126" cy="0"/>
+          </a:xfrm>
+          <a:prstGeom prst="straightConnector1">
+            <a:avLst/>
+          </a:prstGeom>
+          <a:ln>
+            <a:tailEnd type="triangle"/>
+          </a:ln>
+        </p:spPr>
+        <p:style>
+          <a:lnRef idx="1">
+            <a:schemeClr val="accent1"/>
+          </a:lnRef>
+          <a:fillRef idx="0">
+            <a:schemeClr val="accent1"/>
+          </a:fillRef>
+          <a:effectRef idx="0">
+            <a:schemeClr val="accent1"/>
+          </a:effectRef>
+          <a:fontRef idx="minor">
+            <a:schemeClr val="tx1"/>
+          </a:fontRef>
+        </p:style>
+      </p:cxnSp>
+      <p:sp>
+        <p:nvSpPr>
+          <p:cNvPr id="18" name="TextBox 17"/>
+          <p:cNvSpPr txBox="1"/>
+          <p:nvPr/>
+        </p:nvSpPr>
+        <p:spPr>
+          <a:xfrm>
+            <a:off x="4732424" y="1138808"/>
+            <a:ext cx="1776768" cy="369332"/>
+          </a:xfrm>
+          <a:prstGeom prst="rect">
+            <a:avLst/>
+          </a:prstGeom>
+          <a:noFill/>
+        </p:spPr>
+        <p:txBody>
+          <a:bodyPr wrap="none" rtlCol="0">
+            <a:spAutoFit/>
+          </a:bodyPr>
+          <a:lstStyle/>
+          <a:p>
+            <a:r>
+              <a:rPr lang="en-US" altLang="ko-KR" dirty="0" err="1" smtClean="0"/>
+              <a:t>get_raw_value</a:t>
+            </a:r>
+            <a:r>
+              <a:rPr lang="en-US" altLang="ko-KR" dirty="0" smtClean="0"/>
+              <a:t>()</a:t>
+            </a:r>
+            <a:endParaRPr lang="ko-KR" altLang="en-US" dirty="0"/>
+          </a:p>
+        </p:txBody>
+      </p:sp>
+      <p:cxnSp>
+        <p:nvCxnSpPr>
+          <p:cNvPr id="20" name="직선 화살표 연결선 19"/>
+          <p:cNvCxnSpPr/>
+          <p:nvPr/>
+        </p:nvCxnSpPr>
+        <p:spPr>
+          <a:xfrm flipH="1">
+            <a:off x="3236495" y="1840832"/>
+            <a:ext cx="4514126" cy="0"/>
+          </a:xfrm>
+          <a:prstGeom prst="straightConnector1">
+            <a:avLst/>
+          </a:prstGeom>
+          <a:ln>
+            <a:tailEnd type="triangle"/>
+          </a:ln>
+        </p:spPr>
+        <p:style>
+          <a:lnRef idx="1">
+            <a:schemeClr val="accent1"/>
+          </a:lnRef>
+          <a:fillRef idx="0">
+            <a:schemeClr val="accent1"/>
+          </a:fillRef>
+          <a:effectRef idx="0">
+            <a:schemeClr val="accent1"/>
+          </a:effectRef>
+          <a:fontRef idx="minor">
+            <a:schemeClr val="tx1"/>
+          </a:fontRef>
+        </p:style>
+      </p:cxnSp>
+      <p:cxnSp>
+        <p:nvCxnSpPr>
+          <p:cNvPr id="22" name="직선 화살표 연결선 21"/>
+          <p:cNvCxnSpPr/>
+          <p:nvPr/>
+        </p:nvCxnSpPr>
+        <p:spPr>
+          <a:xfrm flipH="1">
+            <a:off x="782053" y="2117558"/>
+            <a:ext cx="2454442" cy="0"/>
+          </a:xfrm>
+          <a:prstGeom prst="straightConnector1">
+            <a:avLst/>
+          </a:prstGeom>
+          <a:ln>
+            <a:tailEnd type="triangle"/>
+          </a:ln>
+        </p:spPr>
+        <p:style>
+          <a:lnRef idx="1">
+            <a:schemeClr val="accent1"/>
+          </a:lnRef>
+          <a:fillRef idx="0">
+            <a:schemeClr val="accent1"/>
+          </a:fillRef>
+          <a:effectRef idx="0">
+            <a:schemeClr val="accent1"/>
+          </a:effectRef>
+          <a:fontRef idx="minor">
+            <a:schemeClr val="tx1"/>
+          </a:fontRef>
+        </p:style>
+      </p:cxnSp>
+      <p:sp>
+        <p:nvSpPr>
+          <p:cNvPr id="23" name="TextBox 22"/>
+          <p:cNvSpPr txBox="1"/>
+          <p:nvPr/>
+        </p:nvSpPr>
+        <p:spPr>
+          <a:xfrm>
+            <a:off x="1151175" y="1748772"/>
+            <a:ext cx="1161921" cy="369332"/>
+          </a:xfrm>
+          <a:prstGeom prst="rect">
+            <a:avLst/>
+          </a:prstGeom>
+          <a:noFill/>
+        </p:spPr>
+        <p:txBody>
+          <a:bodyPr wrap="none" rtlCol="0">
+            <a:spAutoFit/>
+          </a:bodyPr>
+          <a:lstStyle/>
+          <a:p>
+            <a:r>
+              <a:rPr lang="en-US" altLang="ko-KR" dirty="0" smtClean="0"/>
+              <a:t>Read </a:t>
+            </a:r>
+            <a:r>
+              <a:rPr lang="en-US" altLang="ko-KR" dirty="0" err="1" smtClean="0"/>
+              <a:t>Rsp</a:t>
+            </a:r>
+            <a:endParaRPr lang="ko-KR" altLang="en-US" dirty="0"/>
+          </a:p>
+        </p:txBody>
+      </p:sp>
+      <p:cxnSp>
+        <p:nvCxnSpPr>
+          <p:cNvPr id="24" name="직선 화살표 연결선 23"/>
+          <p:cNvCxnSpPr/>
+          <p:nvPr/>
+        </p:nvCxnSpPr>
+        <p:spPr>
+          <a:xfrm>
+            <a:off x="768326" y="2731169"/>
+            <a:ext cx="2454442" cy="0"/>
+          </a:xfrm>
+          <a:prstGeom prst="straightConnector1">
+            <a:avLst/>
+          </a:prstGeom>
+          <a:ln>
+            <a:tailEnd type="triangle"/>
+          </a:ln>
+        </p:spPr>
+        <p:style>
+          <a:lnRef idx="1">
+            <a:schemeClr val="accent1"/>
+          </a:lnRef>
+          <a:fillRef idx="0">
+            <a:schemeClr val="accent1"/>
+          </a:fillRef>
+          <a:effectRef idx="0">
+            <a:schemeClr val="accent1"/>
+          </a:effectRef>
+          <a:fontRef idx="minor">
+            <a:schemeClr val="tx1"/>
+          </a:fontRef>
+        </p:style>
+      </p:cxnSp>
+      <p:sp>
+        <p:nvSpPr>
+          <p:cNvPr id="25" name="TextBox 24"/>
+          <p:cNvSpPr txBox="1"/>
+          <p:nvPr/>
+        </p:nvSpPr>
+        <p:spPr>
+          <a:xfrm>
+            <a:off x="1290347" y="5269651"/>
+            <a:ext cx="1166923" cy="369332"/>
+          </a:xfrm>
+          <a:prstGeom prst="rect">
+            <a:avLst/>
+          </a:prstGeom>
+          <a:noFill/>
+        </p:spPr>
+        <p:txBody>
+          <a:bodyPr wrap="none" rtlCol="0">
+            <a:spAutoFit/>
+          </a:bodyPr>
+          <a:lstStyle/>
+          <a:p>
+            <a:r>
+              <a:rPr lang="en-US" altLang="ko-KR" dirty="0" smtClean="0"/>
+              <a:t>Write </a:t>
+            </a:r>
+            <a:r>
+              <a:rPr lang="en-US" altLang="ko-KR" dirty="0" err="1" smtClean="0"/>
+              <a:t>req</a:t>
+            </a:r>
+            <a:endParaRPr lang="ko-KR" altLang="en-US" dirty="0"/>
+          </a:p>
+        </p:txBody>
+      </p:sp>
+      <p:cxnSp>
+        <p:nvCxnSpPr>
+          <p:cNvPr id="26" name="직선 화살표 연결선 25"/>
+          <p:cNvCxnSpPr/>
+          <p:nvPr/>
+        </p:nvCxnSpPr>
+        <p:spPr>
+          <a:xfrm>
+            <a:off x="3210736" y="2895600"/>
+            <a:ext cx="4514126" cy="0"/>
+          </a:xfrm>
+          <a:prstGeom prst="straightConnector1">
+            <a:avLst/>
+          </a:prstGeom>
+          <a:ln>
+            <a:tailEnd type="triangle"/>
+          </a:ln>
+        </p:spPr>
+        <p:style>
+          <a:lnRef idx="1">
+            <a:schemeClr val="accent1"/>
+          </a:lnRef>
+          <a:fillRef idx="0">
+            <a:schemeClr val="accent1"/>
+          </a:fillRef>
+          <a:effectRef idx="0">
+            <a:schemeClr val="accent1"/>
+          </a:effectRef>
+          <a:fontRef idx="minor">
+            <a:schemeClr val="tx1"/>
+          </a:fontRef>
+        </p:style>
+      </p:cxnSp>
+      <p:sp>
+        <p:nvSpPr>
+          <p:cNvPr id="27" name="TextBox 26"/>
+          <p:cNvSpPr txBox="1"/>
+          <p:nvPr/>
+        </p:nvSpPr>
+        <p:spPr>
+          <a:xfrm>
+            <a:off x="4706665" y="2530461"/>
+            <a:ext cx="1736694" cy="369332"/>
+          </a:xfrm>
+          <a:prstGeom prst="rect">
+            <a:avLst/>
+          </a:prstGeom>
+          <a:noFill/>
+        </p:spPr>
+        <p:txBody>
+          <a:bodyPr wrap="none" rtlCol="0">
+            <a:spAutoFit/>
+          </a:bodyPr>
+          <a:lstStyle/>
+          <a:p>
+            <a:r>
+              <a:rPr lang="en-US" altLang="ko-KR" dirty="0" err="1" smtClean="0"/>
+              <a:t>set_raw_value</a:t>
+            </a:r>
+            <a:r>
+              <a:rPr lang="en-US" altLang="ko-KR" dirty="0" smtClean="0"/>
+              <a:t>()</a:t>
+            </a:r>
+            <a:endParaRPr lang="ko-KR" altLang="en-US" dirty="0"/>
+          </a:p>
+        </p:txBody>
+      </p:sp>
+      <p:cxnSp>
+        <p:nvCxnSpPr>
+          <p:cNvPr id="28" name="직선 화살표 연결선 27"/>
+          <p:cNvCxnSpPr/>
+          <p:nvPr/>
+        </p:nvCxnSpPr>
+        <p:spPr>
+          <a:xfrm flipH="1">
+            <a:off x="3210736" y="3232485"/>
+            <a:ext cx="4514126" cy="0"/>
+          </a:xfrm>
+          <a:prstGeom prst="straightConnector1">
+            <a:avLst/>
+          </a:prstGeom>
+          <a:ln>
+            <a:tailEnd type="triangle"/>
+          </a:ln>
+        </p:spPr>
+        <p:style>
+          <a:lnRef idx="1">
+            <a:schemeClr val="accent1"/>
+          </a:lnRef>
+          <a:fillRef idx="0">
+            <a:schemeClr val="accent1"/>
+          </a:fillRef>
+          <a:effectRef idx="0">
+            <a:schemeClr val="accent1"/>
+          </a:effectRef>
+          <a:fontRef idx="minor">
+            <a:schemeClr val="tx1"/>
+          </a:fontRef>
+        </p:style>
+      </p:cxnSp>
+      <p:cxnSp>
+        <p:nvCxnSpPr>
+          <p:cNvPr id="29" name="직선 화살표 연결선 28"/>
+          <p:cNvCxnSpPr/>
+          <p:nvPr/>
+        </p:nvCxnSpPr>
+        <p:spPr>
+          <a:xfrm flipH="1">
+            <a:off x="754475" y="3466373"/>
+            <a:ext cx="2454442" cy="0"/>
+          </a:xfrm>
+          <a:prstGeom prst="straightConnector1">
+            <a:avLst/>
+          </a:prstGeom>
+          <a:ln>
+            <a:tailEnd type="triangle"/>
+          </a:ln>
+        </p:spPr>
+        <p:style>
+          <a:lnRef idx="1">
+            <a:schemeClr val="accent1"/>
+          </a:lnRef>
+          <a:fillRef idx="0">
+            <a:schemeClr val="accent1"/>
+          </a:fillRef>
+          <a:effectRef idx="0">
+            <a:schemeClr val="accent1"/>
+          </a:effectRef>
+          <a:fontRef idx="minor">
+            <a:schemeClr val="tx1"/>
+          </a:fontRef>
+        </p:style>
+      </p:cxnSp>
+      <p:sp>
+        <p:nvSpPr>
+          <p:cNvPr id="30" name="TextBox 29"/>
+          <p:cNvSpPr txBox="1"/>
+          <p:nvPr/>
+        </p:nvSpPr>
+        <p:spPr>
+          <a:xfrm>
+            <a:off x="1123597" y="3097587"/>
+            <a:ext cx="1203856" cy="369332"/>
+          </a:xfrm>
+          <a:prstGeom prst="rect">
+            <a:avLst/>
+          </a:prstGeom>
+          <a:noFill/>
+        </p:spPr>
+        <p:txBody>
+          <a:bodyPr wrap="none" rtlCol="0">
+            <a:spAutoFit/>
+          </a:bodyPr>
+          <a:lstStyle/>
+          <a:p>
+            <a:r>
+              <a:rPr lang="en-US" altLang="ko-KR" dirty="0" smtClean="0"/>
+              <a:t>Write </a:t>
+            </a:r>
+            <a:r>
+              <a:rPr lang="en-US" altLang="ko-KR" dirty="0" err="1" smtClean="0"/>
+              <a:t>Rsp</a:t>
+            </a:r>
+            <a:endParaRPr lang="ko-KR" altLang="en-US" dirty="0"/>
+          </a:p>
+        </p:txBody>
+      </p:sp>
+      <p:cxnSp>
+        <p:nvCxnSpPr>
+          <p:cNvPr id="32" name="직선 화살표 연결선 31"/>
+          <p:cNvCxnSpPr/>
+          <p:nvPr/>
+        </p:nvCxnSpPr>
+        <p:spPr>
+          <a:xfrm flipH="1">
+            <a:off x="782053" y="3922295"/>
+            <a:ext cx="4512306" cy="0"/>
+          </a:xfrm>
+          <a:prstGeom prst="straightConnector1">
+            <a:avLst/>
+          </a:prstGeom>
+          <a:ln>
+            <a:tailEnd type="triangle"/>
+          </a:ln>
+        </p:spPr>
+        <p:style>
+          <a:lnRef idx="1">
+            <a:schemeClr val="accent1"/>
+          </a:lnRef>
+          <a:fillRef idx="0">
+            <a:schemeClr val="accent1"/>
+          </a:fillRef>
+          <a:effectRef idx="0">
+            <a:schemeClr val="accent1"/>
+          </a:effectRef>
+          <a:fontRef idx="minor">
+            <a:schemeClr val="tx1"/>
+          </a:fontRef>
+        </p:style>
+      </p:cxnSp>
+      <p:sp>
+        <p:nvSpPr>
+          <p:cNvPr id="33" name="TextBox 32"/>
+          <p:cNvSpPr txBox="1"/>
+          <p:nvPr/>
+        </p:nvSpPr>
+        <p:spPr>
+          <a:xfrm>
+            <a:off x="3222768" y="3565178"/>
+            <a:ext cx="1124988" cy="369332"/>
+          </a:xfrm>
+          <a:prstGeom prst="rect">
+            <a:avLst/>
+          </a:prstGeom>
+          <a:noFill/>
+        </p:spPr>
+        <p:txBody>
+          <a:bodyPr wrap="none" rtlCol="0">
+            <a:spAutoFit/>
+          </a:bodyPr>
+          <a:lstStyle/>
+          <a:p>
+            <a:r>
+              <a:rPr lang="en-US" altLang="ko-KR" dirty="0" smtClean="0"/>
+              <a:t>Read </a:t>
+            </a:r>
+            <a:r>
+              <a:rPr lang="en-US" altLang="ko-KR" dirty="0" err="1" smtClean="0"/>
+              <a:t>req</a:t>
+            </a:r>
+            <a:endParaRPr lang="ko-KR" altLang="en-US" dirty="0"/>
+          </a:p>
+        </p:txBody>
+      </p:sp>
+      <p:cxnSp>
+        <p:nvCxnSpPr>
+          <p:cNvPr id="35" name="직선 화살표 연결선 34"/>
+          <p:cNvCxnSpPr/>
+          <p:nvPr/>
+        </p:nvCxnSpPr>
+        <p:spPr>
+          <a:xfrm>
+            <a:off x="782053" y="4271211"/>
+            <a:ext cx="4512306" cy="0"/>
+          </a:xfrm>
+          <a:prstGeom prst="straightConnector1">
+            <a:avLst/>
+          </a:prstGeom>
+          <a:ln>
+            <a:tailEnd type="triangle"/>
+          </a:ln>
+        </p:spPr>
+        <p:style>
+          <a:lnRef idx="1">
+            <a:schemeClr val="accent1"/>
+          </a:lnRef>
+          <a:fillRef idx="0">
+            <a:schemeClr val="accent1"/>
+          </a:fillRef>
+          <a:effectRef idx="0">
+            <a:schemeClr val="accent1"/>
+          </a:effectRef>
+          <a:fontRef idx="minor">
+            <a:schemeClr val="tx1"/>
+          </a:fontRef>
+        </p:style>
+      </p:cxnSp>
+      <p:sp>
+        <p:nvSpPr>
+          <p:cNvPr id="36" name="TextBox 35"/>
+          <p:cNvSpPr txBox="1"/>
+          <p:nvPr/>
+        </p:nvSpPr>
+        <p:spPr>
+          <a:xfrm>
+            <a:off x="3235006" y="3966596"/>
+            <a:ext cx="1104277" cy="369332"/>
+          </a:xfrm>
+          <a:prstGeom prst="rect">
+            <a:avLst/>
+          </a:prstGeom>
+          <a:noFill/>
+        </p:spPr>
+        <p:txBody>
+          <a:bodyPr wrap="none" rtlCol="0">
+            <a:spAutoFit/>
+          </a:bodyPr>
+          <a:lstStyle/>
+          <a:p>
+            <a:r>
+              <a:rPr lang="en-US" altLang="ko-KR" dirty="0" smtClean="0"/>
+              <a:t>Read </a:t>
+            </a:r>
+            <a:r>
+              <a:rPr lang="en-US" altLang="ko-KR" dirty="0" err="1" smtClean="0"/>
+              <a:t>rsp</a:t>
+            </a:r>
+            <a:endParaRPr lang="ko-KR" altLang="en-US" dirty="0"/>
+          </a:p>
+        </p:txBody>
+      </p:sp>
+      <p:cxnSp>
+        <p:nvCxnSpPr>
+          <p:cNvPr id="38" name="직선 화살표 연결선 37"/>
+          <p:cNvCxnSpPr/>
+          <p:nvPr/>
+        </p:nvCxnSpPr>
+        <p:spPr>
+          <a:xfrm>
+            <a:off x="5294359" y="4451684"/>
+            <a:ext cx="2456262" cy="0"/>
+          </a:xfrm>
+          <a:prstGeom prst="straightConnector1">
+            <a:avLst/>
+          </a:prstGeom>
+          <a:ln>
+            <a:tailEnd type="triangle"/>
+          </a:ln>
+        </p:spPr>
+        <p:style>
+          <a:lnRef idx="1">
+            <a:schemeClr val="accent1"/>
+          </a:lnRef>
+          <a:fillRef idx="0">
+            <a:schemeClr val="accent1"/>
+          </a:fillRef>
+          <a:effectRef idx="0">
+            <a:schemeClr val="accent1"/>
+          </a:effectRef>
+          <a:fontRef idx="minor">
+            <a:schemeClr val="tx1"/>
+          </a:fontRef>
+        </p:style>
+      </p:cxnSp>
+      <p:sp>
+        <p:nvSpPr>
+          <p:cNvPr id="39" name="TextBox 38"/>
+          <p:cNvSpPr txBox="1"/>
+          <p:nvPr/>
+        </p:nvSpPr>
+        <p:spPr>
+          <a:xfrm>
+            <a:off x="5560510" y="4082351"/>
+            <a:ext cx="1736694" cy="369332"/>
+          </a:xfrm>
+          <a:prstGeom prst="rect">
+            <a:avLst/>
+          </a:prstGeom>
+          <a:noFill/>
+        </p:spPr>
+        <p:txBody>
+          <a:bodyPr wrap="none" rtlCol="0">
+            <a:spAutoFit/>
+          </a:bodyPr>
+          <a:lstStyle/>
+          <a:p>
+            <a:r>
+              <a:rPr lang="en-US" altLang="ko-KR" dirty="0" err="1" smtClean="0"/>
+              <a:t>set_raw_value</a:t>
+            </a:r>
+            <a:r>
+              <a:rPr lang="en-US" altLang="ko-KR" dirty="0" smtClean="0"/>
+              <a:t>()</a:t>
+            </a:r>
+            <a:endParaRPr lang="ko-KR" altLang="en-US" dirty="0"/>
+          </a:p>
+        </p:txBody>
+      </p:sp>
+      <p:cxnSp>
+        <p:nvCxnSpPr>
+          <p:cNvPr id="41" name="직선 화살표 연결선 40"/>
+          <p:cNvCxnSpPr/>
+          <p:nvPr/>
+        </p:nvCxnSpPr>
+        <p:spPr>
+          <a:xfrm>
+            <a:off x="3208917" y="5161547"/>
+            <a:ext cx="4515945" cy="0"/>
+          </a:xfrm>
+          <a:prstGeom prst="straightConnector1">
+            <a:avLst/>
+          </a:prstGeom>
+          <a:ln>
+            <a:tailEnd type="triangle"/>
+          </a:ln>
+        </p:spPr>
+        <p:style>
+          <a:lnRef idx="1">
+            <a:schemeClr val="accent1"/>
+          </a:lnRef>
+          <a:fillRef idx="0">
+            <a:schemeClr val="accent1"/>
+          </a:fillRef>
+          <a:effectRef idx="0">
+            <a:schemeClr val="accent1"/>
+          </a:effectRef>
+          <a:fontRef idx="minor">
+            <a:schemeClr val="tx1"/>
+          </a:fontRef>
+        </p:style>
+      </p:cxnSp>
+      <p:sp>
+        <p:nvSpPr>
+          <p:cNvPr id="42" name="TextBox 41"/>
+          <p:cNvSpPr txBox="1"/>
+          <p:nvPr/>
+        </p:nvSpPr>
+        <p:spPr>
+          <a:xfrm>
+            <a:off x="4652089" y="4823203"/>
+            <a:ext cx="1776768" cy="369332"/>
+          </a:xfrm>
+          <a:prstGeom prst="rect">
+            <a:avLst/>
+          </a:prstGeom>
+          <a:noFill/>
+        </p:spPr>
+        <p:txBody>
+          <a:bodyPr wrap="none" rtlCol="0">
+            <a:spAutoFit/>
+          </a:bodyPr>
+          <a:lstStyle/>
+          <a:p>
+            <a:r>
+              <a:rPr lang="en-US" altLang="ko-KR" dirty="0" err="1" smtClean="0"/>
+              <a:t>get_raw_value</a:t>
+            </a:r>
+            <a:r>
+              <a:rPr lang="en-US" altLang="ko-KR" dirty="0" smtClean="0"/>
+              <a:t>()</a:t>
+            </a:r>
+            <a:endParaRPr lang="ko-KR" altLang="en-US" dirty="0"/>
+          </a:p>
+        </p:txBody>
+      </p:sp>
+      <p:cxnSp>
+        <p:nvCxnSpPr>
+          <p:cNvPr id="43" name="직선 화살표 연결선 42"/>
+          <p:cNvCxnSpPr/>
+          <p:nvPr/>
+        </p:nvCxnSpPr>
+        <p:spPr>
+          <a:xfrm flipH="1">
+            <a:off x="3208917" y="5454317"/>
+            <a:ext cx="4514126" cy="0"/>
+          </a:xfrm>
+          <a:prstGeom prst="straightConnector1">
+            <a:avLst/>
+          </a:prstGeom>
+          <a:ln>
+            <a:tailEnd type="triangle"/>
+          </a:ln>
+        </p:spPr>
+        <p:style>
+          <a:lnRef idx="1">
+            <a:schemeClr val="accent1"/>
+          </a:lnRef>
+          <a:fillRef idx="0">
+            <a:schemeClr val="accent1"/>
+          </a:fillRef>
+          <a:effectRef idx="0">
+            <a:schemeClr val="accent1"/>
+          </a:effectRef>
+          <a:fontRef idx="minor">
+            <a:schemeClr val="tx1"/>
+          </a:fontRef>
+        </p:style>
+      </p:cxnSp>
+      <p:cxnSp>
+        <p:nvCxnSpPr>
+          <p:cNvPr id="44" name="직선 화살표 연결선 43"/>
+          <p:cNvCxnSpPr/>
+          <p:nvPr/>
+        </p:nvCxnSpPr>
+        <p:spPr>
+          <a:xfrm flipH="1">
+            <a:off x="782053" y="5638800"/>
+            <a:ext cx="2452953" cy="0"/>
+          </a:xfrm>
+          <a:prstGeom prst="straightConnector1">
+            <a:avLst/>
+          </a:prstGeom>
+          <a:ln>
+            <a:tailEnd type="triangle"/>
+          </a:ln>
+        </p:spPr>
+        <p:style>
+          <a:lnRef idx="1">
+            <a:schemeClr val="accent1"/>
+          </a:lnRef>
+          <a:fillRef idx="0">
+            <a:schemeClr val="accent1"/>
+          </a:fillRef>
+          <a:effectRef idx="0">
+            <a:schemeClr val="accent1"/>
+          </a:effectRef>
+          <a:fontRef idx="minor">
+            <a:schemeClr val="tx1"/>
+          </a:fontRef>
+        </p:style>
+      </p:cxnSp>
+      <p:sp>
+        <p:nvSpPr>
+          <p:cNvPr id="46" name="TextBox 45"/>
+          <p:cNvSpPr txBox="1"/>
+          <p:nvPr/>
+        </p:nvSpPr>
+        <p:spPr>
+          <a:xfrm>
+            <a:off x="1276239" y="2431475"/>
+            <a:ext cx="1166923" cy="369332"/>
+          </a:xfrm>
+          <a:prstGeom prst="rect">
+            <a:avLst/>
+          </a:prstGeom>
+          <a:noFill/>
+        </p:spPr>
+        <p:txBody>
+          <a:bodyPr wrap="none" rtlCol="0">
+            <a:spAutoFit/>
+          </a:bodyPr>
+          <a:lstStyle/>
+          <a:p>
+            <a:r>
+              <a:rPr lang="en-US" altLang="ko-KR" dirty="0" smtClean="0"/>
+              <a:t>Write </a:t>
+            </a:r>
+            <a:r>
+              <a:rPr lang="en-US" altLang="ko-KR" dirty="0" err="1" smtClean="0"/>
+              <a:t>req</a:t>
+            </a:r>
+            <a:endParaRPr lang="ko-KR" altLang="en-US" dirty="0"/>
+          </a:p>
+        </p:txBody>
+      </p:sp>
+      <p:cxnSp>
+        <p:nvCxnSpPr>
+          <p:cNvPr id="47" name="직선 화살표 연결선 46"/>
+          <p:cNvCxnSpPr/>
+          <p:nvPr/>
+        </p:nvCxnSpPr>
+        <p:spPr>
+          <a:xfrm>
+            <a:off x="768326" y="6071937"/>
+            <a:ext cx="2454442" cy="0"/>
+          </a:xfrm>
+          <a:prstGeom prst="straightConnector1">
+            <a:avLst/>
+          </a:prstGeom>
+          <a:ln>
+            <a:tailEnd type="triangle"/>
+          </a:ln>
+        </p:spPr>
+        <p:style>
+          <a:lnRef idx="1">
+            <a:schemeClr val="accent1"/>
+          </a:lnRef>
+          <a:fillRef idx="0">
+            <a:schemeClr val="accent1"/>
+          </a:fillRef>
+          <a:effectRef idx="0">
+            <a:schemeClr val="accent1"/>
+          </a:effectRef>
+          <a:fontRef idx="minor">
+            <a:schemeClr val="tx1"/>
+          </a:fontRef>
+        </p:style>
+      </p:cxnSp>
+      <p:sp>
+        <p:nvSpPr>
+          <p:cNvPr id="48" name="TextBox 47"/>
+          <p:cNvSpPr txBox="1"/>
+          <p:nvPr/>
+        </p:nvSpPr>
+        <p:spPr>
+          <a:xfrm>
+            <a:off x="1290347" y="5702423"/>
+            <a:ext cx="1203856" cy="369332"/>
+          </a:xfrm>
+          <a:prstGeom prst="rect">
+            <a:avLst/>
+          </a:prstGeom>
+          <a:noFill/>
+        </p:spPr>
+        <p:txBody>
+          <a:bodyPr wrap="none" rtlCol="0">
+            <a:spAutoFit/>
+          </a:bodyPr>
+          <a:lstStyle/>
+          <a:p>
+            <a:r>
+              <a:rPr lang="en-US" altLang="ko-KR" dirty="0" smtClean="0"/>
+              <a:t>Write </a:t>
+            </a:r>
+            <a:r>
+              <a:rPr lang="en-US" altLang="ko-KR" dirty="0" err="1" smtClean="0"/>
+              <a:t>Rsp</a:t>
+            </a:r>
+            <a:endParaRPr lang="ko-KR" altLang="en-US" dirty="0"/>
+          </a:p>
+        </p:txBody>
+      </p:sp>
+      <p:sp>
+        <p:nvSpPr>
+          <p:cNvPr id="49" name="TextBox 48"/>
+          <p:cNvSpPr txBox="1"/>
+          <p:nvPr/>
+        </p:nvSpPr>
+        <p:spPr>
+          <a:xfrm>
+            <a:off x="9048308" y="395953"/>
+            <a:ext cx="718466" cy="369332"/>
+          </a:xfrm>
+          <a:prstGeom prst="rect">
+            <a:avLst/>
+          </a:prstGeom>
+          <a:noFill/>
+        </p:spPr>
+        <p:txBody>
+          <a:bodyPr wrap="square" rtlCol="0">
+            <a:spAutoFit/>
+          </a:bodyPr>
+          <a:lstStyle/>
+          <a:p>
+            <a:r>
+              <a:rPr lang="en-US" altLang="ko-KR" dirty="0" smtClean="0"/>
+              <a:t>Local</a:t>
+            </a:r>
+            <a:endParaRPr lang="ko-KR" altLang="en-US" dirty="0"/>
+          </a:p>
+        </p:txBody>
+      </p:sp>
+      <p:cxnSp>
+        <p:nvCxnSpPr>
+          <p:cNvPr id="54" name="직선 연결선 53"/>
+          <p:cNvCxnSpPr>
+            <a:stCxn id="49" idx="2"/>
+          </p:cNvCxnSpPr>
+          <p:nvPr/>
+        </p:nvCxnSpPr>
+        <p:spPr>
+          <a:xfrm>
+            <a:off x="9407541" y="765285"/>
+            <a:ext cx="0" cy="5406915"/>
+          </a:xfrm>
+          <a:prstGeom prst="line">
+            <a:avLst/>
+          </a:prstGeom>
+        </p:spPr>
+        <p:style>
+          <a:lnRef idx="1">
+            <a:schemeClr val="accent1"/>
+          </a:lnRef>
+          <a:fillRef idx="0">
+            <a:schemeClr val="accent1"/>
+          </a:fillRef>
+          <a:effectRef idx="0">
+            <a:schemeClr val="accent1"/>
+          </a:effectRef>
+          <a:fontRef idx="minor">
+            <a:schemeClr val="tx1"/>
+          </a:fontRef>
+        </p:style>
+      </p:cxnSp>
+      <p:sp>
+        <p:nvSpPr>
+          <p:cNvPr id="56" name="TextBox 55"/>
+          <p:cNvSpPr txBox="1"/>
+          <p:nvPr/>
+        </p:nvSpPr>
+        <p:spPr>
+          <a:xfrm>
+            <a:off x="9485375" y="1121584"/>
+            <a:ext cx="671979" cy="369332"/>
+          </a:xfrm>
+          <a:prstGeom prst="rect">
+            <a:avLst/>
+          </a:prstGeom>
+          <a:noFill/>
+        </p:spPr>
+        <p:txBody>
+          <a:bodyPr wrap="none" rtlCol="0">
+            <a:spAutoFit/>
+          </a:bodyPr>
+          <a:lstStyle/>
+          <a:p>
+            <a:r>
+              <a:rPr lang="en-US" altLang="ko-KR" dirty="0" smtClean="0"/>
+              <a:t>Scan</a:t>
+            </a:r>
+            <a:endParaRPr lang="ko-KR" altLang="en-US" dirty="0"/>
+          </a:p>
+        </p:txBody>
+      </p:sp>
+      <p:cxnSp>
+        <p:nvCxnSpPr>
+          <p:cNvPr id="58" name="직선 화살표 연결선 57"/>
+          <p:cNvCxnSpPr/>
+          <p:nvPr/>
+        </p:nvCxnSpPr>
+        <p:spPr>
+          <a:xfrm flipH="1">
+            <a:off x="7763500" y="1624263"/>
+            <a:ext cx="1644041" cy="0"/>
+          </a:xfrm>
+          <a:prstGeom prst="straightConnector1">
+            <a:avLst/>
+          </a:prstGeom>
+          <a:ln>
+            <a:tailEnd type="triangle"/>
+          </a:ln>
+        </p:spPr>
+        <p:style>
+          <a:lnRef idx="1">
+            <a:schemeClr val="accent1"/>
+          </a:lnRef>
+          <a:fillRef idx="0">
+            <a:schemeClr val="accent1"/>
+          </a:fillRef>
+          <a:effectRef idx="0">
+            <a:schemeClr val="accent1"/>
+          </a:effectRef>
+          <a:fontRef idx="minor">
+            <a:schemeClr val="tx1"/>
+          </a:fontRef>
+        </p:style>
+      </p:cxnSp>
+      <p:sp>
+        <p:nvSpPr>
+          <p:cNvPr id="59" name="TextBox 58"/>
+          <p:cNvSpPr txBox="1"/>
+          <p:nvPr/>
+        </p:nvSpPr>
+        <p:spPr>
+          <a:xfrm>
+            <a:off x="7765325" y="1237250"/>
+            <a:ext cx="1736694" cy="369332"/>
+          </a:xfrm>
+          <a:prstGeom prst="rect">
+            <a:avLst/>
+          </a:prstGeom>
+          <a:noFill/>
+        </p:spPr>
+        <p:txBody>
+          <a:bodyPr wrap="none" rtlCol="0">
+            <a:spAutoFit/>
+          </a:bodyPr>
+          <a:lstStyle/>
+          <a:p>
+            <a:r>
+              <a:rPr lang="en-US" altLang="ko-KR" dirty="0" err="1" smtClean="0"/>
+              <a:t>set_raw_value</a:t>
+            </a:r>
+            <a:r>
+              <a:rPr lang="en-US" altLang="ko-KR" dirty="0" smtClean="0"/>
+              <a:t>()</a:t>
+            </a:r>
+            <a:endParaRPr lang="ko-KR" altLang="en-US" dirty="0"/>
+          </a:p>
+        </p:txBody>
+      </p:sp>
+      <p:cxnSp>
+        <p:nvCxnSpPr>
+          <p:cNvPr id="63" name="직선 화살표 연결선 62"/>
+          <p:cNvCxnSpPr/>
+          <p:nvPr/>
+        </p:nvCxnSpPr>
+        <p:spPr>
+          <a:xfrm flipH="1">
+            <a:off x="7763500" y="2225842"/>
+            <a:ext cx="1644041" cy="0"/>
+          </a:xfrm>
+          <a:prstGeom prst="straightConnector1">
+            <a:avLst/>
+          </a:prstGeom>
+          <a:ln>
+            <a:tailEnd type="triangle"/>
+          </a:ln>
+        </p:spPr>
+        <p:style>
+          <a:lnRef idx="1">
+            <a:schemeClr val="accent1"/>
+          </a:lnRef>
+          <a:fillRef idx="0">
+            <a:schemeClr val="accent1"/>
+          </a:fillRef>
+          <a:effectRef idx="0">
+            <a:schemeClr val="accent1"/>
+          </a:effectRef>
+          <a:fontRef idx="minor">
+            <a:schemeClr val="tx1"/>
+          </a:fontRef>
+        </p:style>
+      </p:cxnSp>
+      <p:sp>
+        <p:nvSpPr>
+          <p:cNvPr id="64" name="TextBox 63"/>
+          <p:cNvSpPr txBox="1"/>
+          <p:nvPr/>
+        </p:nvSpPr>
+        <p:spPr>
+          <a:xfrm>
+            <a:off x="7735918" y="1838828"/>
+            <a:ext cx="1776768" cy="369332"/>
+          </a:xfrm>
+          <a:prstGeom prst="rect">
+            <a:avLst/>
+          </a:prstGeom>
+          <a:noFill/>
+        </p:spPr>
+        <p:txBody>
+          <a:bodyPr wrap="none" rtlCol="0">
+            <a:spAutoFit/>
+          </a:bodyPr>
+          <a:lstStyle/>
+          <a:p>
+            <a:r>
+              <a:rPr lang="en-US" altLang="ko-KR" dirty="0" err="1" smtClean="0"/>
+              <a:t>get_raw_value</a:t>
+            </a:r>
+            <a:r>
+              <a:rPr lang="en-US" altLang="ko-KR" dirty="0" smtClean="0"/>
+              <a:t>()</a:t>
+            </a:r>
+            <a:endParaRPr lang="ko-KR" altLang="en-US" dirty="0"/>
+          </a:p>
+        </p:txBody>
+      </p:sp>
+      <p:cxnSp>
+        <p:nvCxnSpPr>
+          <p:cNvPr id="66" name="직선 화살표 연결선 65"/>
+          <p:cNvCxnSpPr/>
+          <p:nvPr/>
+        </p:nvCxnSpPr>
+        <p:spPr>
+          <a:xfrm>
+            <a:off x="9407541" y="2431475"/>
+            <a:ext cx="1360722" cy="0"/>
+          </a:xfrm>
+          <a:prstGeom prst="straightConnector1">
+            <a:avLst/>
+          </a:prstGeom>
+          <a:ln>
+            <a:tailEnd type="triangle"/>
+          </a:ln>
+        </p:spPr>
+        <p:style>
+          <a:lnRef idx="1">
+            <a:schemeClr val="accent1"/>
+          </a:lnRef>
+          <a:fillRef idx="0">
+            <a:schemeClr val="accent1"/>
+          </a:fillRef>
+          <a:effectRef idx="0">
+            <a:schemeClr val="accent1"/>
+          </a:effectRef>
+          <a:fontRef idx="minor">
+            <a:schemeClr val="tx1"/>
+          </a:fontRef>
+        </p:style>
+      </p:cxnSp>
+      <p:sp>
+        <p:nvSpPr>
+          <p:cNvPr id="67" name="TextBox 66"/>
+          <p:cNvSpPr txBox="1"/>
+          <p:nvPr/>
+        </p:nvSpPr>
+        <p:spPr>
+          <a:xfrm>
+            <a:off x="9554580" y="2117558"/>
+            <a:ext cx="575799" cy="369332"/>
+          </a:xfrm>
+          <a:prstGeom prst="rect">
+            <a:avLst/>
+          </a:prstGeom>
+          <a:noFill/>
+        </p:spPr>
+        <p:txBody>
+          <a:bodyPr wrap="none" rtlCol="0">
+            <a:spAutoFit/>
+          </a:bodyPr>
+          <a:lstStyle/>
+          <a:p>
+            <a:r>
+              <a:rPr lang="en-US" altLang="ko-KR" dirty="0" smtClean="0"/>
+              <a:t>Out</a:t>
+            </a:r>
+            <a:endParaRPr lang="ko-KR" altLang="en-US" dirty="0"/>
+          </a:p>
+        </p:txBody>
+      </p:sp>
+      <p:sp>
+        <p:nvSpPr>
+          <p:cNvPr id="69" name="왼쪽으로 구부러진 화살표 68"/>
+          <p:cNvSpPr/>
+          <p:nvPr/>
+        </p:nvSpPr>
+        <p:spPr>
+          <a:xfrm>
+            <a:off x="10768263" y="992539"/>
+            <a:ext cx="759417" cy="1846665"/>
+          </a:xfrm>
+          <a:prstGeom prst="curvedLeftArrow">
+            <a:avLst/>
+          </a:prstGeom>
+        </p:spPr>
+        <p:style>
+          <a:lnRef idx="2">
+            <a:schemeClr val="accent1">
+              <a:shade val="50000"/>
+            </a:schemeClr>
+          </a:lnRef>
+          <a:fillRef idx="1">
+            <a:schemeClr val="accent1"/>
+          </a:fillRef>
+          <a:effectRef idx="0">
+            <a:schemeClr val="accent1"/>
+          </a:effectRef>
+          <a:fontRef idx="minor">
+            <a:schemeClr val="lt1"/>
+          </a:fontRef>
+        </p:style>
+        <p:txBody>
+          <a:bodyPr rtlCol="0" anchor="ctr"/>
+          <a:lstStyle/>
+          <a:p>
+            <a:pPr algn="ctr"/>
+            <a:endParaRPr lang="ko-KR" altLang="en-US">
+              <a:solidFill>
+                <a:schemeClr val="tx1"/>
+              </a:solidFill>
+            </a:endParaRPr>
+          </a:p>
+        </p:txBody>
+      </p:sp>
+      <p:sp>
+        <p:nvSpPr>
+          <p:cNvPr id="70" name="TextBox 69"/>
+          <p:cNvSpPr txBox="1"/>
+          <p:nvPr/>
+        </p:nvSpPr>
+        <p:spPr>
+          <a:xfrm>
+            <a:off x="10872606" y="642078"/>
+            <a:ext cx="708848" cy="369332"/>
+          </a:xfrm>
+          <a:prstGeom prst="rect">
+            <a:avLst/>
+          </a:prstGeom>
+          <a:noFill/>
+        </p:spPr>
+        <p:txBody>
+          <a:bodyPr wrap="none" rtlCol="0">
+            <a:spAutoFit/>
+          </a:bodyPr>
+          <a:lstStyle/>
+          <a:p>
+            <a:r>
+              <a:rPr lang="en-US" altLang="ko-KR" dirty="0" smtClean="0"/>
+              <a:t>Loop</a:t>
+            </a:r>
+            <a:endParaRPr lang="ko-KR" altLang="en-US" dirty="0"/>
+          </a:p>
+        </p:txBody>
+      </p:sp>
+      <p:sp>
+        <p:nvSpPr>
+          <p:cNvPr id="71" name="직사각형 70"/>
+          <p:cNvSpPr/>
+          <p:nvPr/>
+        </p:nvSpPr>
+        <p:spPr>
+          <a:xfrm>
+            <a:off x="3165234" y="829726"/>
+            <a:ext cx="113122" cy="2768996"/>
+          </a:xfrm>
+          <a:prstGeom prst="rect">
+            <a:avLst/>
+          </a:prstGeom>
+        </p:spPr>
+        <p:style>
+          <a:lnRef idx="2">
+            <a:schemeClr val="accent1">
+              <a:shade val="50000"/>
+            </a:schemeClr>
+          </a:lnRef>
+          <a:fillRef idx="1">
+            <a:schemeClr val="accent1"/>
+          </a:fillRef>
+          <a:effectRef idx="0">
+            <a:schemeClr val="accent1"/>
+          </a:effectRef>
+          <a:fontRef idx="minor">
+            <a:schemeClr val="lt1"/>
+          </a:fontRef>
+        </p:style>
+        <p:txBody>
+          <a:bodyPr rtlCol="0" anchor="ctr"/>
+          <a:lstStyle/>
+          <a:p>
+            <a:pPr algn="ctr"/>
+            <a:endParaRPr lang="ko-KR" altLang="en-US"/>
+          </a:p>
+        </p:txBody>
+      </p:sp>
+      <p:sp>
+        <p:nvSpPr>
+          <p:cNvPr id="72" name="직사각형 71"/>
+          <p:cNvSpPr/>
+          <p:nvPr/>
+        </p:nvSpPr>
+        <p:spPr>
+          <a:xfrm>
+            <a:off x="5244237" y="3445225"/>
+            <a:ext cx="113122" cy="2768996"/>
+          </a:xfrm>
+          <a:prstGeom prst="rect">
+            <a:avLst/>
+          </a:prstGeom>
+        </p:spPr>
+        <p:style>
+          <a:lnRef idx="2">
+            <a:schemeClr val="accent1">
+              <a:shade val="50000"/>
+            </a:schemeClr>
+          </a:lnRef>
+          <a:fillRef idx="1">
+            <a:schemeClr val="accent1"/>
+          </a:fillRef>
+          <a:effectRef idx="0">
+            <a:schemeClr val="accent1"/>
+          </a:effectRef>
+          <a:fontRef idx="minor">
+            <a:schemeClr val="lt1"/>
+          </a:fontRef>
+        </p:style>
+        <p:txBody>
+          <a:bodyPr rtlCol="0" anchor="ctr"/>
+          <a:lstStyle/>
+          <a:p>
+            <a:pPr algn="ctr"/>
+            <a:endParaRPr lang="ko-KR" altLang="en-US"/>
+          </a:p>
+        </p:txBody>
+      </p:sp>
+      <p:sp>
+        <p:nvSpPr>
+          <p:cNvPr id="73" name="직사각형 72"/>
+          <p:cNvSpPr/>
+          <p:nvPr/>
+        </p:nvSpPr>
+        <p:spPr>
+          <a:xfrm>
+            <a:off x="7706935" y="980891"/>
+            <a:ext cx="110056" cy="1704566"/>
+          </a:xfrm>
+          <a:prstGeom prst="rect">
+            <a:avLst/>
+          </a:prstGeom>
+        </p:spPr>
+        <p:style>
+          <a:lnRef idx="2">
+            <a:schemeClr val="accent1">
+              <a:shade val="50000"/>
+            </a:schemeClr>
+          </a:lnRef>
+          <a:fillRef idx="1">
+            <a:schemeClr val="accent1"/>
+          </a:fillRef>
+          <a:effectRef idx="0">
+            <a:schemeClr val="accent1"/>
+          </a:effectRef>
+          <a:fontRef idx="minor">
+            <a:schemeClr val="lt1"/>
+          </a:fontRef>
+        </p:style>
+        <p:txBody>
+          <a:bodyPr rtlCol="0" anchor="ctr"/>
+          <a:lstStyle/>
+          <a:p>
+            <a:pPr algn="ctr"/>
+            <a:endParaRPr lang="ko-KR" altLang="en-US"/>
+          </a:p>
+        </p:txBody>
+      </p:sp>
+      <p:sp>
+        <p:nvSpPr>
+          <p:cNvPr id="74" name="TextBox 73"/>
+          <p:cNvSpPr txBox="1"/>
+          <p:nvPr/>
+        </p:nvSpPr>
+        <p:spPr>
+          <a:xfrm>
+            <a:off x="131068" y="213197"/>
+            <a:ext cx="2592543" cy="369332"/>
+          </a:xfrm>
+          <a:prstGeom prst="rect">
+            <a:avLst/>
+          </a:prstGeom>
+          <a:noFill/>
+        </p:spPr>
+        <p:txBody>
+          <a:bodyPr wrap="square" rtlCol="0">
+            <a:spAutoFit/>
+          </a:bodyPr>
+          <a:lstStyle/>
+          <a:p>
+            <a:r>
+              <a:rPr lang="en-US" altLang="ko-KR" dirty="0" smtClean="0"/>
+              <a:t>Option #1 </a:t>
+            </a:r>
+            <a:endParaRPr lang="ko-KR" altLang="en-US" dirty="0"/>
+          </a:p>
+        </p:txBody>
+      </p:sp>
+      <p:sp>
+        <p:nvSpPr>
+          <p:cNvPr id="76" name="TextBox 75"/>
+          <p:cNvSpPr txBox="1"/>
+          <p:nvPr/>
+        </p:nvSpPr>
+        <p:spPr>
+          <a:xfrm>
+            <a:off x="8172685" y="3586877"/>
+            <a:ext cx="3640082" cy="1477328"/>
+          </a:xfrm>
+          <a:prstGeom prst="rect">
+            <a:avLst/>
+          </a:prstGeom>
+          <a:noFill/>
+        </p:spPr>
+        <p:txBody>
+          <a:bodyPr wrap="square" rtlCol="0">
+            <a:spAutoFit/>
+          </a:bodyPr>
+          <a:lstStyle/>
+          <a:p>
+            <a:r>
+              <a:rPr lang="en-US" altLang="ko-KR" dirty="0" smtClean="0"/>
+              <a:t>Pros</a:t>
+            </a:r>
+          </a:p>
+          <a:p>
+            <a:r>
+              <a:rPr lang="en-US" altLang="ko-KR" dirty="0"/>
+              <a:t> </a:t>
+            </a:r>
+            <a:r>
+              <a:rPr lang="en-US" altLang="ko-KR" dirty="0" smtClean="0"/>
+              <a:t>simple</a:t>
+            </a:r>
+          </a:p>
+          <a:p>
+            <a:endParaRPr lang="en-US" altLang="ko-KR" dirty="0"/>
+          </a:p>
+          <a:p>
+            <a:r>
+              <a:rPr lang="en-US" altLang="ko-KR" dirty="0" smtClean="0"/>
+              <a:t>Cons</a:t>
+            </a:r>
+          </a:p>
+          <a:p>
+            <a:r>
+              <a:rPr lang="en-US" altLang="ko-KR" dirty="0"/>
+              <a:t> </a:t>
+            </a:r>
+            <a:r>
+              <a:rPr lang="en-US" altLang="ko-KR" dirty="0" smtClean="0"/>
+              <a:t> </a:t>
+            </a:r>
+            <a:r>
+              <a:rPr lang="en-US" altLang="ko-KR" smtClean="0"/>
+              <a:t>core bottleneck</a:t>
+            </a:r>
+            <a:endParaRPr lang="ko-KR" altLang="en-US" dirty="0"/>
+          </a:p>
+        </p:txBody>
+      </p:sp>
+    </p:spTree>
+    <p:extLst>
+      <p:ext uri="{BB962C8B-B14F-4D97-AF65-F5344CB8AC3E}">
+        <p14:creationId xmlns:p14="http://schemas.microsoft.com/office/powerpoint/2010/main" val="2466141568"/>
+      </p:ext>
+    </p:extLst>
+  </p:cSld>
+  <p:clrMapOvr>
+    <a:masterClrMapping/>
+  </p:clrMapOvr>
+</p:sld>
+</file>
+
+<file path=ppt/slides/slide6.xml><?xml version="1.0" encoding="utf-8"?>
+<p:sld xmlns:a="http://schemas.openxmlformats.org/drawingml/2006/main" xmlns:r="http://schemas.openxmlformats.org/officeDocument/2006/relationships" xmlns:p="http://schemas.openxmlformats.org/presentationml/2006/main">
+  <p:cSld>
+    <p:spTree>
+      <p:nvGrpSpPr>
+        <p:cNvPr id="1" name=""/>
+        <p:cNvGrpSpPr/>
+        <p:nvPr/>
+      </p:nvGrpSpPr>
+      <p:grpSpPr>
+        <a:xfrm>
+          <a:off x="0" y="0"/>
+          <a:ext cx="0" cy="0"/>
+          <a:chOff x="0" y="0"/>
+          <a:chExt cx="0" cy="0"/>
+        </a:xfrm>
+      </p:grpSpPr>
+      <p:sp>
+        <p:nvSpPr>
+          <p:cNvPr id="52" name="TextBox 51"/>
+          <p:cNvSpPr txBox="1"/>
+          <p:nvPr/>
+        </p:nvSpPr>
+        <p:spPr>
+          <a:xfrm>
+            <a:off x="2863517" y="409075"/>
+            <a:ext cx="720197" cy="369332"/>
+          </a:xfrm>
+          <a:prstGeom prst="rect">
+            <a:avLst/>
+          </a:prstGeom>
+          <a:noFill/>
+        </p:spPr>
+        <p:txBody>
+          <a:bodyPr wrap="none" rtlCol="0">
+            <a:spAutoFit/>
+          </a:bodyPr>
+          <a:lstStyle/>
+          <a:p>
+            <a:r>
+              <a:rPr lang="en-US" altLang="ko-KR" dirty="0" smtClean="0"/>
+              <a:t>Slave</a:t>
+            </a:r>
+            <a:endParaRPr lang="ko-KR" altLang="en-US" dirty="0"/>
+          </a:p>
+        </p:txBody>
+      </p:sp>
+      <p:sp>
+        <p:nvSpPr>
+          <p:cNvPr id="53" name="TextBox 52"/>
+          <p:cNvSpPr txBox="1"/>
+          <p:nvPr/>
+        </p:nvSpPr>
+        <p:spPr>
+          <a:xfrm>
+            <a:off x="4844717" y="409075"/>
+            <a:ext cx="899285" cy="369332"/>
+          </a:xfrm>
+          <a:prstGeom prst="rect">
+            <a:avLst/>
+          </a:prstGeom>
+          <a:noFill/>
+        </p:spPr>
+        <p:txBody>
+          <a:bodyPr wrap="none" rtlCol="0">
+            <a:spAutoFit/>
+          </a:bodyPr>
+          <a:lstStyle/>
+          <a:p>
+            <a:r>
+              <a:rPr lang="en-US" altLang="ko-KR" dirty="0" smtClean="0"/>
+              <a:t>Master</a:t>
+            </a:r>
+            <a:endParaRPr lang="ko-KR" altLang="en-US" dirty="0"/>
+          </a:p>
+        </p:txBody>
+      </p:sp>
+      <p:sp>
+        <p:nvSpPr>
+          <p:cNvPr id="54" name="TextBox 53"/>
+          <p:cNvSpPr txBox="1"/>
+          <p:nvPr/>
+        </p:nvSpPr>
+        <p:spPr>
+          <a:xfrm>
+            <a:off x="7415465" y="409075"/>
+            <a:ext cx="670312" cy="369332"/>
+          </a:xfrm>
+          <a:prstGeom prst="rect">
+            <a:avLst/>
+          </a:prstGeom>
+          <a:noFill/>
+        </p:spPr>
+        <p:txBody>
+          <a:bodyPr wrap="none" rtlCol="0">
+            <a:spAutoFit/>
+          </a:bodyPr>
+          <a:lstStyle/>
+          <a:p>
+            <a:r>
+              <a:rPr lang="en-US" altLang="ko-KR" dirty="0" smtClean="0"/>
+              <a:t>Core</a:t>
+            </a:r>
+            <a:endParaRPr lang="ko-KR" altLang="en-US" dirty="0"/>
+          </a:p>
+        </p:txBody>
+      </p:sp>
+      <p:cxnSp>
+        <p:nvCxnSpPr>
+          <p:cNvPr id="55" name="직선 연결선 54"/>
+          <p:cNvCxnSpPr>
+            <a:stCxn id="52" idx="2"/>
+          </p:cNvCxnSpPr>
+          <p:nvPr/>
+        </p:nvCxnSpPr>
+        <p:spPr>
+          <a:xfrm>
+            <a:off x="3223616" y="778407"/>
+            <a:ext cx="0" cy="5393793"/>
+          </a:xfrm>
+          <a:prstGeom prst="line">
+            <a:avLst/>
+          </a:prstGeom>
+        </p:spPr>
+        <p:style>
+          <a:lnRef idx="1">
+            <a:schemeClr val="accent1"/>
+          </a:lnRef>
+          <a:fillRef idx="0">
+            <a:schemeClr val="accent1"/>
+          </a:fillRef>
+          <a:effectRef idx="0">
+            <a:schemeClr val="accent1"/>
+          </a:effectRef>
+          <a:fontRef idx="minor">
+            <a:schemeClr val="tx1"/>
+          </a:fontRef>
+        </p:style>
+      </p:cxnSp>
+      <p:cxnSp>
+        <p:nvCxnSpPr>
+          <p:cNvPr id="56" name="직선 연결선 55"/>
+          <p:cNvCxnSpPr>
+            <a:stCxn id="53" idx="2"/>
+          </p:cNvCxnSpPr>
+          <p:nvPr/>
+        </p:nvCxnSpPr>
+        <p:spPr>
+          <a:xfrm flipH="1">
+            <a:off x="5294359" y="778407"/>
+            <a:ext cx="1" cy="5309572"/>
+          </a:xfrm>
+          <a:prstGeom prst="line">
+            <a:avLst/>
+          </a:prstGeom>
+        </p:spPr>
+        <p:style>
+          <a:lnRef idx="1">
+            <a:schemeClr val="accent1"/>
+          </a:lnRef>
+          <a:fillRef idx="0">
+            <a:schemeClr val="accent1"/>
+          </a:fillRef>
+          <a:effectRef idx="0">
+            <a:schemeClr val="accent1"/>
+          </a:effectRef>
+          <a:fontRef idx="minor">
+            <a:schemeClr val="tx1"/>
+          </a:fontRef>
+        </p:style>
+      </p:cxnSp>
+      <p:cxnSp>
+        <p:nvCxnSpPr>
+          <p:cNvPr id="57" name="직선 연결선 56"/>
+          <p:cNvCxnSpPr>
+            <a:stCxn id="54" idx="2"/>
+          </p:cNvCxnSpPr>
+          <p:nvPr/>
+        </p:nvCxnSpPr>
+        <p:spPr>
+          <a:xfrm>
+            <a:off x="7750621" y="778407"/>
+            <a:ext cx="0" cy="5393793"/>
+          </a:xfrm>
+          <a:prstGeom prst="line">
+            <a:avLst/>
+          </a:prstGeom>
+        </p:spPr>
+        <p:style>
+          <a:lnRef idx="1">
+            <a:schemeClr val="accent1"/>
+          </a:lnRef>
+          <a:fillRef idx="0">
+            <a:schemeClr val="accent1"/>
+          </a:fillRef>
+          <a:effectRef idx="0">
+            <a:schemeClr val="accent1"/>
+          </a:effectRef>
+          <a:fontRef idx="minor">
+            <a:schemeClr val="tx1"/>
+          </a:fontRef>
+        </p:style>
+      </p:cxnSp>
+      <p:cxnSp>
+        <p:nvCxnSpPr>
+          <p:cNvPr id="58" name="직선 화살표 연결선 57"/>
+          <p:cNvCxnSpPr/>
+          <p:nvPr/>
+        </p:nvCxnSpPr>
+        <p:spPr>
+          <a:xfrm>
+            <a:off x="782053" y="1323474"/>
+            <a:ext cx="2454442" cy="0"/>
+          </a:xfrm>
+          <a:prstGeom prst="straightConnector1">
+            <a:avLst/>
+          </a:prstGeom>
+          <a:ln>
+            <a:tailEnd type="triangle"/>
+          </a:ln>
+        </p:spPr>
+        <p:style>
+          <a:lnRef idx="1">
+            <a:schemeClr val="accent1"/>
+          </a:lnRef>
+          <a:fillRef idx="0">
+            <a:schemeClr val="accent1"/>
+          </a:fillRef>
+          <a:effectRef idx="0">
+            <a:schemeClr val="accent1"/>
+          </a:effectRef>
+          <a:fontRef idx="minor">
+            <a:schemeClr val="tx1"/>
+          </a:fontRef>
+        </p:style>
+      </p:cxnSp>
+      <p:sp>
+        <p:nvSpPr>
+          <p:cNvPr id="59" name="TextBox 58"/>
+          <p:cNvSpPr txBox="1"/>
+          <p:nvPr/>
+        </p:nvSpPr>
+        <p:spPr>
+          <a:xfrm>
+            <a:off x="1151175" y="954142"/>
+            <a:ext cx="1124988" cy="369332"/>
+          </a:xfrm>
+          <a:prstGeom prst="rect">
+            <a:avLst/>
+          </a:prstGeom>
+          <a:noFill/>
+        </p:spPr>
+        <p:txBody>
+          <a:bodyPr wrap="none" rtlCol="0">
+            <a:spAutoFit/>
+          </a:bodyPr>
+          <a:lstStyle/>
+          <a:p>
+            <a:r>
+              <a:rPr lang="en-US" altLang="ko-KR" dirty="0" smtClean="0"/>
+              <a:t>Read </a:t>
+            </a:r>
+            <a:r>
+              <a:rPr lang="en-US" altLang="ko-KR" dirty="0" err="1" smtClean="0"/>
+              <a:t>req</a:t>
+            </a:r>
+            <a:endParaRPr lang="ko-KR" altLang="en-US" dirty="0"/>
+          </a:p>
+        </p:txBody>
+      </p:sp>
+      <p:sp>
+        <p:nvSpPr>
+          <p:cNvPr id="61" name="TextBox 60"/>
+          <p:cNvSpPr txBox="1"/>
+          <p:nvPr/>
+        </p:nvSpPr>
+        <p:spPr>
+          <a:xfrm>
+            <a:off x="4663923" y="1511970"/>
+            <a:ext cx="1776768" cy="369332"/>
+          </a:xfrm>
+          <a:prstGeom prst="rect">
+            <a:avLst/>
+          </a:prstGeom>
+          <a:noFill/>
+        </p:spPr>
+        <p:txBody>
+          <a:bodyPr wrap="none" rtlCol="0">
+            <a:spAutoFit/>
+          </a:bodyPr>
+          <a:lstStyle/>
+          <a:p>
+            <a:r>
+              <a:rPr lang="en-US" altLang="ko-KR" dirty="0" err="1" smtClean="0"/>
+              <a:t>get_raw_value</a:t>
+            </a:r>
+            <a:r>
+              <a:rPr lang="en-US" altLang="ko-KR" dirty="0" smtClean="0"/>
+              <a:t>()</a:t>
+            </a:r>
+            <a:endParaRPr lang="ko-KR" altLang="en-US" dirty="0"/>
+          </a:p>
+        </p:txBody>
+      </p:sp>
+      <p:cxnSp>
+        <p:nvCxnSpPr>
+          <p:cNvPr id="62" name="직선 화살표 연결선 61"/>
+          <p:cNvCxnSpPr/>
+          <p:nvPr/>
+        </p:nvCxnSpPr>
+        <p:spPr>
+          <a:xfrm flipH="1">
+            <a:off x="3236495" y="1840832"/>
+            <a:ext cx="4514126" cy="0"/>
+          </a:xfrm>
+          <a:prstGeom prst="straightConnector1">
+            <a:avLst/>
+          </a:prstGeom>
+          <a:ln>
+            <a:tailEnd type="triangle"/>
+          </a:ln>
+        </p:spPr>
+        <p:style>
+          <a:lnRef idx="1">
+            <a:schemeClr val="accent1"/>
+          </a:lnRef>
+          <a:fillRef idx="0">
+            <a:schemeClr val="accent1"/>
+          </a:fillRef>
+          <a:effectRef idx="0">
+            <a:schemeClr val="accent1"/>
+          </a:effectRef>
+          <a:fontRef idx="minor">
+            <a:schemeClr val="tx1"/>
+          </a:fontRef>
+        </p:style>
+      </p:cxnSp>
+      <p:cxnSp>
+        <p:nvCxnSpPr>
+          <p:cNvPr id="63" name="직선 화살표 연결선 62"/>
+          <p:cNvCxnSpPr/>
+          <p:nvPr/>
+        </p:nvCxnSpPr>
+        <p:spPr>
+          <a:xfrm flipH="1">
+            <a:off x="794933" y="1707758"/>
+            <a:ext cx="2454442" cy="0"/>
+          </a:xfrm>
+          <a:prstGeom prst="straightConnector1">
+            <a:avLst/>
+          </a:prstGeom>
+          <a:ln>
+            <a:tailEnd type="triangle"/>
+          </a:ln>
+        </p:spPr>
+        <p:style>
+          <a:lnRef idx="1">
+            <a:schemeClr val="accent1"/>
+          </a:lnRef>
+          <a:fillRef idx="0">
+            <a:schemeClr val="accent1"/>
+          </a:fillRef>
+          <a:effectRef idx="0">
+            <a:schemeClr val="accent1"/>
+          </a:effectRef>
+          <a:fontRef idx="minor">
+            <a:schemeClr val="tx1"/>
+          </a:fontRef>
+        </p:style>
+      </p:cxnSp>
+      <p:sp>
+        <p:nvSpPr>
+          <p:cNvPr id="64" name="TextBox 63"/>
+          <p:cNvSpPr txBox="1"/>
+          <p:nvPr/>
+        </p:nvSpPr>
+        <p:spPr>
+          <a:xfrm>
+            <a:off x="1164055" y="1338972"/>
+            <a:ext cx="1161921" cy="369332"/>
+          </a:xfrm>
+          <a:prstGeom prst="rect">
+            <a:avLst/>
+          </a:prstGeom>
+          <a:noFill/>
+        </p:spPr>
+        <p:txBody>
+          <a:bodyPr wrap="none" rtlCol="0">
+            <a:spAutoFit/>
+          </a:bodyPr>
+          <a:lstStyle/>
+          <a:p>
+            <a:r>
+              <a:rPr lang="en-US" altLang="ko-KR" dirty="0" smtClean="0"/>
+              <a:t>Read </a:t>
+            </a:r>
+            <a:r>
+              <a:rPr lang="en-US" altLang="ko-KR" dirty="0" err="1" smtClean="0"/>
+              <a:t>Rsp</a:t>
+            </a:r>
+            <a:endParaRPr lang="ko-KR" altLang="en-US" dirty="0"/>
+          </a:p>
+        </p:txBody>
+      </p:sp>
+      <p:cxnSp>
+        <p:nvCxnSpPr>
+          <p:cNvPr id="65" name="직선 화살표 연결선 64"/>
+          <p:cNvCxnSpPr/>
+          <p:nvPr/>
+        </p:nvCxnSpPr>
+        <p:spPr>
+          <a:xfrm>
+            <a:off x="768326" y="2185286"/>
+            <a:ext cx="2454442" cy="0"/>
+          </a:xfrm>
+          <a:prstGeom prst="straightConnector1">
+            <a:avLst/>
+          </a:prstGeom>
+          <a:ln>
+            <a:tailEnd type="triangle"/>
+          </a:ln>
+        </p:spPr>
+        <p:style>
+          <a:lnRef idx="1">
+            <a:schemeClr val="accent1"/>
+          </a:lnRef>
+          <a:fillRef idx="0">
+            <a:schemeClr val="accent1"/>
+          </a:fillRef>
+          <a:effectRef idx="0">
+            <a:schemeClr val="accent1"/>
+          </a:effectRef>
+          <a:fontRef idx="minor">
+            <a:schemeClr val="tx1"/>
+          </a:fontRef>
+        </p:style>
+      </p:cxnSp>
+      <p:sp>
+        <p:nvSpPr>
+          <p:cNvPr id="66" name="TextBox 65"/>
+          <p:cNvSpPr txBox="1"/>
+          <p:nvPr/>
+        </p:nvSpPr>
+        <p:spPr>
+          <a:xfrm>
+            <a:off x="1290347" y="5269651"/>
+            <a:ext cx="1166923" cy="369332"/>
+          </a:xfrm>
+          <a:prstGeom prst="rect">
+            <a:avLst/>
+          </a:prstGeom>
+          <a:noFill/>
+        </p:spPr>
+        <p:txBody>
+          <a:bodyPr wrap="none" rtlCol="0">
+            <a:spAutoFit/>
+          </a:bodyPr>
+          <a:lstStyle/>
+          <a:p>
+            <a:r>
+              <a:rPr lang="en-US" altLang="ko-KR" dirty="0" smtClean="0"/>
+              <a:t>Write </a:t>
+            </a:r>
+            <a:r>
+              <a:rPr lang="en-US" altLang="ko-KR" dirty="0" err="1" smtClean="0"/>
+              <a:t>req</a:t>
+            </a:r>
+            <a:endParaRPr lang="ko-KR" altLang="en-US" dirty="0"/>
+          </a:p>
+        </p:txBody>
+      </p:sp>
+      <p:sp>
+        <p:nvSpPr>
+          <p:cNvPr id="68" name="TextBox 67"/>
+          <p:cNvSpPr txBox="1"/>
+          <p:nvPr/>
+        </p:nvSpPr>
+        <p:spPr>
+          <a:xfrm>
+            <a:off x="4672126" y="1820599"/>
+            <a:ext cx="1736694" cy="369332"/>
+          </a:xfrm>
+          <a:prstGeom prst="rect">
+            <a:avLst/>
+          </a:prstGeom>
+          <a:noFill/>
+        </p:spPr>
+        <p:txBody>
+          <a:bodyPr wrap="none" rtlCol="0">
+            <a:spAutoFit/>
+          </a:bodyPr>
+          <a:lstStyle/>
+          <a:p>
+            <a:r>
+              <a:rPr lang="en-US" altLang="ko-KR" dirty="0" err="1" smtClean="0"/>
+              <a:t>set_raw_value</a:t>
+            </a:r>
+            <a:r>
+              <a:rPr lang="en-US" altLang="ko-KR" dirty="0" smtClean="0"/>
+              <a:t>()</a:t>
+            </a:r>
+            <a:endParaRPr lang="ko-KR" altLang="en-US" dirty="0"/>
+          </a:p>
+        </p:txBody>
+      </p:sp>
+      <p:cxnSp>
+        <p:nvCxnSpPr>
+          <p:cNvPr id="69" name="직선 화살표 연결선 68"/>
+          <p:cNvCxnSpPr/>
+          <p:nvPr/>
+        </p:nvCxnSpPr>
+        <p:spPr>
+          <a:xfrm flipH="1">
+            <a:off x="3165234" y="2181276"/>
+            <a:ext cx="4514126" cy="0"/>
+          </a:xfrm>
+          <a:prstGeom prst="straightConnector1">
+            <a:avLst/>
+          </a:prstGeom>
+          <a:ln>
+            <a:tailEnd type="triangle"/>
+          </a:ln>
+        </p:spPr>
+        <p:style>
+          <a:lnRef idx="1">
+            <a:schemeClr val="accent1"/>
+          </a:lnRef>
+          <a:fillRef idx="0">
+            <a:schemeClr val="accent1"/>
+          </a:fillRef>
+          <a:effectRef idx="0">
+            <a:schemeClr val="accent1"/>
+          </a:effectRef>
+          <a:fontRef idx="minor">
+            <a:schemeClr val="tx1"/>
+          </a:fontRef>
+        </p:style>
+      </p:cxnSp>
+      <p:cxnSp>
+        <p:nvCxnSpPr>
+          <p:cNvPr id="70" name="직선 화살표 연결선 69"/>
+          <p:cNvCxnSpPr/>
+          <p:nvPr/>
+        </p:nvCxnSpPr>
+        <p:spPr>
+          <a:xfrm flipH="1">
+            <a:off x="804994" y="2603294"/>
+            <a:ext cx="2454442" cy="0"/>
+          </a:xfrm>
+          <a:prstGeom prst="straightConnector1">
+            <a:avLst/>
+          </a:prstGeom>
+          <a:ln>
+            <a:tailEnd type="triangle"/>
+          </a:ln>
+        </p:spPr>
+        <p:style>
+          <a:lnRef idx="1">
+            <a:schemeClr val="accent1"/>
+          </a:lnRef>
+          <a:fillRef idx="0">
+            <a:schemeClr val="accent1"/>
+          </a:fillRef>
+          <a:effectRef idx="0">
+            <a:schemeClr val="accent1"/>
+          </a:effectRef>
+          <a:fontRef idx="minor">
+            <a:schemeClr val="tx1"/>
+          </a:fontRef>
+        </p:style>
+      </p:cxnSp>
+      <p:sp>
+        <p:nvSpPr>
+          <p:cNvPr id="71" name="TextBox 70"/>
+          <p:cNvSpPr txBox="1"/>
+          <p:nvPr/>
+        </p:nvSpPr>
+        <p:spPr>
+          <a:xfrm>
+            <a:off x="1174116" y="2234508"/>
+            <a:ext cx="1203856" cy="369332"/>
+          </a:xfrm>
+          <a:prstGeom prst="rect">
+            <a:avLst/>
+          </a:prstGeom>
+          <a:noFill/>
+        </p:spPr>
+        <p:txBody>
+          <a:bodyPr wrap="none" rtlCol="0">
+            <a:spAutoFit/>
+          </a:bodyPr>
+          <a:lstStyle/>
+          <a:p>
+            <a:r>
+              <a:rPr lang="en-US" altLang="ko-KR" dirty="0" smtClean="0"/>
+              <a:t>Write </a:t>
+            </a:r>
+            <a:r>
+              <a:rPr lang="en-US" altLang="ko-KR" dirty="0" err="1" smtClean="0"/>
+              <a:t>Rsp</a:t>
+            </a:r>
+            <a:endParaRPr lang="ko-KR" altLang="en-US" dirty="0"/>
+          </a:p>
+        </p:txBody>
+      </p:sp>
+      <p:cxnSp>
+        <p:nvCxnSpPr>
+          <p:cNvPr id="72" name="직선 화살표 연결선 71"/>
+          <p:cNvCxnSpPr/>
+          <p:nvPr/>
+        </p:nvCxnSpPr>
+        <p:spPr>
+          <a:xfrm flipH="1">
+            <a:off x="782053" y="3922295"/>
+            <a:ext cx="4512306" cy="0"/>
+          </a:xfrm>
+          <a:prstGeom prst="straightConnector1">
+            <a:avLst/>
+          </a:prstGeom>
+          <a:ln>
+            <a:tailEnd type="triangle"/>
+          </a:ln>
+        </p:spPr>
+        <p:style>
+          <a:lnRef idx="1">
+            <a:schemeClr val="accent1"/>
+          </a:lnRef>
+          <a:fillRef idx="0">
+            <a:schemeClr val="accent1"/>
+          </a:fillRef>
+          <a:effectRef idx="0">
+            <a:schemeClr val="accent1"/>
+          </a:effectRef>
+          <a:fontRef idx="minor">
+            <a:schemeClr val="tx1"/>
+          </a:fontRef>
+        </p:style>
+      </p:cxnSp>
+      <p:sp>
+        <p:nvSpPr>
+          <p:cNvPr id="73" name="TextBox 72"/>
+          <p:cNvSpPr txBox="1"/>
+          <p:nvPr/>
+        </p:nvSpPr>
+        <p:spPr>
+          <a:xfrm>
+            <a:off x="3222768" y="3565178"/>
+            <a:ext cx="1124988" cy="369332"/>
+          </a:xfrm>
+          <a:prstGeom prst="rect">
+            <a:avLst/>
+          </a:prstGeom>
+          <a:noFill/>
+        </p:spPr>
+        <p:txBody>
+          <a:bodyPr wrap="none" rtlCol="0">
+            <a:spAutoFit/>
+          </a:bodyPr>
+          <a:lstStyle/>
+          <a:p>
+            <a:r>
+              <a:rPr lang="en-US" altLang="ko-KR" dirty="0" smtClean="0"/>
+              <a:t>Read </a:t>
+            </a:r>
+            <a:r>
+              <a:rPr lang="en-US" altLang="ko-KR" dirty="0" err="1" smtClean="0"/>
+              <a:t>req</a:t>
+            </a:r>
+            <a:endParaRPr lang="ko-KR" altLang="en-US" dirty="0"/>
+          </a:p>
+        </p:txBody>
+      </p:sp>
+      <p:cxnSp>
+        <p:nvCxnSpPr>
+          <p:cNvPr id="74" name="직선 화살표 연결선 73"/>
+          <p:cNvCxnSpPr/>
+          <p:nvPr/>
+        </p:nvCxnSpPr>
+        <p:spPr>
+          <a:xfrm>
+            <a:off x="782053" y="4271211"/>
+            <a:ext cx="4512306" cy="0"/>
+          </a:xfrm>
+          <a:prstGeom prst="straightConnector1">
+            <a:avLst/>
+          </a:prstGeom>
+          <a:ln>
+            <a:tailEnd type="triangle"/>
+          </a:ln>
+        </p:spPr>
+        <p:style>
+          <a:lnRef idx="1">
+            <a:schemeClr val="accent1"/>
+          </a:lnRef>
+          <a:fillRef idx="0">
+            <a:schemeClr val="accent1"/>
+          </a:fillRef>
+          <a:effectRef idx="0">
+            <a:schemeClr val="accent1"/>
+          </a:effectRef>
+          <a:fontRef idx="minor">
+            <a:schemeClr val="tx1"/>
+          </a:fontRef>
+        </p:style>
+      </p:cxnSp>
+      <p:sp>
+        <p:nvSpPr>
+          <p:cNvPr id="75" name="TextBox 74"/>
+          <p:cNvSpPr txBox="1"/>
+          <p:nvPr/>
+        </p:nvSpPr>
+        <p:spPr>
+          <a:xfrm>
+            <a:off x="3235006" y="3966596"/>
+            <a:ext cx="1104277" cy="369332"/>
+          </a:xfrm>
+          <a:prstGeom prst="rect">
+            <a:avLst/>
+          </a:prstGeom>
+          <a:noFill/>
+        </p:spPr>
+        <p:txBody>
+          <a:bodyPr wrap="none" rtlCol="0">
+            <a:spAutoFit/>
+          </a:bodyPr>
+          <a:lstStyle/>
+          <a:p>
+            <a:r>
+              <a:rPr lang="en-US" altLang="ko-KR" dirty="0" smtClean="0"/>
+              <a:t>Read </a:t>
+            </a:r>
+            <a:r>
+              <a:rPr lang="en-US" altLang="ko-KR" dirty="0" err="1" smtClean="0"/>
+              <a:t>rsp</a:t>
+            </a:r>
+            <a:endParaRPr lang="ko-KR" altLang="en-US" dirty="0"/>
+          </a:p>
+        </p:txBody>
+      </p:sp>
+      <p:cxnSp>
+        <p:nvCxnSpPr>
+          <p:cNvPr id="81" name="직선 화살표 연결선 80"/>
+          <p:cNvCxnSpPr/>
+          <p:nvPr/>
+        </p:nvCxnSpPr>
+        <p:spPr>
+          <a:xfrm flipH="1">
+            <a:off x="782054" y="5638800"/>
+            <a:ext cx="4548642" cy="0"/>
+          </a:xfrm>
+          <a:prstGeom prst="straightConnector1">
+            <a:avLst/>
+          </a:prstGeom>
+          <a:ln>
+            <a:tailEnd type="triangle"/>
+          </a:ln>
+        </p:spPr>
+        <p:style>
+          <a:lnRef idx="1">
+            <a:schemeClr val="accent1"/>
+          </a:lnRef>
+          <a:fillRef idx="0">
+            <a:schemeClr val="accent1"/>
+          </a:fillRef>
+          <a:effectRef idx="0">
+            <a:schemeClr val="accent1"/>
+          </a:effectRef>
+          <a:fontRef idx="minor">
+            <a:schemeClr val="tx1"/>
+          </a:fontRef>
+        </p:style>
+      </p:cxnSp>
+      <p:sp>
+        <p:nvSpPr>
+          <p:cNvPr id="82" name="TextBox 81"/>
+          <p:cNvSpPr txBox="1"/>
+          <p:nvPr/>
+        </p:nvSpPr>
+        <p:spPr>
+          <a:xfrm>
+            <a:off x="1276239" y="1885592"/>
+            <a:ext cx="1166923" cy="369332"/>
+          </a:xfrm>
+          <a:prstGeom prst="rect">
+            <a:avLst/>
+          </a:prstGeom>
+          <a:noFill/>
+        </p:spPr>
+        <p:txBody>
+          <a:bodyPr wrap="none" rtlCol="0">
+            <a:spAutoFit/>
+          </a:bodyPr>
+          <a:lstStyle/>
+          <a:p>
+            <a:r>
+              <a:rPr lang="en-US" altLang="ko-KR" dirty="0" smtClean="0"/>
+              <a:t>Write </a:t>
+            </a:r>
+            <a:r>
+              <a:rPr lang="en-US" altLang="ko-KR" dirty="0" err="1" smtClean="0"/>
+              <a:t>req</a:t>
+            </a:r>
+            <a:endParaRPr lang="ko-KR" altLang="en-US" dirty="0"/>
+          </a:p>
+        </p:txBody>
+      </p:sp>
+      <p:cxnSp>
+        <p:nvCxnSpPr>
+          <p:cNvPr id="83" name="직선 화살표 연결선 82"/>
+          <p:cNvCxnSpPr/>
+          <p:nvPr/>
+        </p:nvCxnSpPr>
+        <p:spPr>
+          <a:xfrm>
+            <a:off x="768326" y="6071937"/>
+            <a:ext cx="4475911" cy="0"/>
+          </a:xfrm>
+          <a:prstGeom prst="straightConnector1">
+            <a:avLst/>
+          </a:prstGeom>
+          <a:ln>
+            <a:tailEnd type="triangle"/>
+          </a:ln>
+        </p:spPr>
+        <p:style>
+          <a:lnRef idx="1">
+            <a:schemeClr val="accent1"/>
+          </a:lnRef>
+          <a:fillRef idx="0">
+            <a:schemeClr val="accent1"/>
+          </a:fillRef>
+          <a:effectRef idx="0">
+            <a:schemeClr val="accent1"/>
+          </a:effectRef>
+          <a:fontRef idx="minor">
+            <a:schemeClr val="tx1"/>
+          </a:fontRef>
+        </p:style>
+      </p:cxnSp>
+      <p:sp>
+        <p:nvSpPr>
+          <p:cNvPr id="84" name="TextBox 83"/>
+          <p:cNvSpPr txBox="1"/>
+          <p:nvPr/>
+        </p:nvSpPr>
+        <p:spPr>
+          <a:xfrm>
+            <a:off x="1290347" y="5702423"/>
+            <a:ext cx="1203856" cy="369332"/>
+          </a:xfrm>
+          <a:prstGeom prst="rect">
+            <a:avLst/>
+          </a:prstGeom>
+          <a:noFill/>
+        </p:spPr>
+        <p:txBody>
+          <a:bodyPr wrap="none" rtlCol="0">
+            <a:spAutoFit/>
+          </a:bodyPr>
+          <a:lstStyle/>
+          <a:p>
+            <a:r>
+              <a:rPr lang="en-US" altLang="ko-KR" dirty="0" smtClean="0"/>
+              <a:t>Write </a:t>
+            </a:r>
+            <a:r>
+              <a:rPr lang="en-US" altLang="ko-KR" dirty="0" err="1" smtClean="0"/>
+              <a:t>Rsp</a:t>
+            </a:r>
+            <a:endParaRPr lang="ko-KR" altLang="en-US" dirty="0"/>
+          </a:p>
+        </p:txBody>
+      </p:sp>
+      <p:sp>
+        <p:nvSpPr>
+          <p:cNvPr id="85" name="TextBox 84"/>
+          <p:cNvSpPr txBox="1"/>
+          <p:nvPr/>
+        </p:nvSpPr>
+        <p:spPr>
+          <a:xfrm>
+            <a:off x="9048308" y="395953"/>
+            <a:ext cx="718466" cy="369332"/>
+          </a:xfrm>
+          <a:prstGeom prst="rect">
+            <a:avLst/>
+          </a:prstGeom>
+          <a:noFill/>
+        </p:spPr>
+        <p:txBody>
+          <a:bodyPr wrap="square" rtlCol="0">
+            <a:spAutoFit/>
+          </a:bodyPr>
+          <a:lstStyle/>
+          <a:p>
+            <a:r>
+              <a:rPr lang="en-US" altLang="ko-KR" dirty="0" smtClean="0"/>
+              <a:t>Local</a:t>
+            </a:r>
+            <a:endParaRPr lang="ko-KR" altLang="en-US" dirty="0"/>
+          </a:p>
+        </p:txBody>
+      </p:sp>
+      <p:cxnSp>
+        <p:nvCxnSpPr>
+          <p:cNvPr id="86" name="직선 연결선 85"/>
+          <p:cNvCxnSpPr>
+            <a:stCxn id="85" idx="2"/>
+          </p:cNvCxnSpPr>
+          <p:nvPr/>
+        </p:nvCxnSpPr>
+        <p:spPr>
+          <a:xfrm>
+            <a:off x="9407541" y="765285"/>
+            <a:ext cx="0" cy="5406915"/>
+          </a:xfrm>
+          <a:prstGeom prst="line">
+            <a:avLst/>
+          </a:prstGeom>
+        </p:spPr>
+        <p:style>
+          <a:lnRef idx="1">
+            <a:schemeClr val="accent1"/>
+          </a:lnRef>
+          <a:fillRef idx="0">
+            <a:schemeClr val="accent1"/>
+          </a:fillRef>
+          <a:effectRef idx="0">
+            <a:schemeClr val="accent1"/>
+          </a:effectRef>
+          <a:fontRef idx="minor">
+            <a:schemeClr val="tx1"/>
+          </a:fontRef>
+        </p:style>
+      </p:cxnSp>
+      <p:sp>
+        <p:nvSpPr>
+          <p:cNvPr id="87" name="TextBox 86"/>
+          <p:cNvSpPr txBox="1"/>
+          <p:nvPr/>
+        </p:nvSpPr>
+        <p:spPr>
+          <a:xfrm>
+            <a:off x="9485375" y="1121584"/>
+            <a:ext cx="671979" cy="369332"/>
+          </a:xfrm>
+          <a:prstGeom prst="rect">
+            <a:avLst/>
+          </a:prstGeom>
+          <a:noFill/>
+        </p:spPr>
+        <p:txBody>
+          <a:bodyPr wrap="none" rtlCol="0">
+            <a:spAutoFit/>
+          </a:bodyPr>
+          <a:lstStyle/>
+          <a:p>
+            <a:r>
+              <a:rPr lang="en-US" altLang="ko-KR" dirty="0" smtClean="0"/>
+              <a:t>Scan</a:t>
+            </a:r>
+            <a:endParaRPr lang="ko-KR" altLang="en-US" dirty="0"/>
+          </a:p>
+        </p:txBody>
+      </p:sp>
+      <p:cxnSp>
+        <p:nvCxnSpPr>
+          <p:cNvPr id="88" name="직선 화살표 연결선 87"/>
+          <p:cNvCxnSpPr/>
+          <p:nvPr/>
+        </p:nvCxnSpPr>
+        <p:spPr>
+          <a:xfrm flipH="1">
+            <a:off x="7763500" y="1624263"/>
+            <a:ext cx="1644041" cy="0"/>
+          </a:xfrm>
+          <a:prstGeom prst="straightConnector1">
+            <a:avLst/>
+          </a:prstGeom>
+          <a:ln>
+            <a:headEnd type="triangle"/>
+            <a:tailEnd type="none"/>
+          </a:ln>
+        </p:spPr>
+        <p:style>
+          <a:lnRef idx="1">
+            <a:schemeClr val="accent1"/>
+          </a:lnRef>
+          <a:fillRef idx="0">
+            <a:schemeClr val="accent1"/>
+          </a:fillRef>
+          <a:effectRef idx="0">
+            <a:schemeClr val="accent1"/>
+          </a:effectRef>
+          <a:fontRef idx="minor">
+            <a:schemeClr val="tx1"/>
+          </a:fontRef>
+        </p:style>
+      </p:cxnSp>
+      <p:sp>
+        <p:nvSpPr>
+          <p:cNvPr id="89" name="TextBox 88"/>
+          <p:cNvSpPr txBox="1"/>
+          <p:nvPr/>
+        </p:nvSpPr>
+        <p:spPr>
+          <a:xfrm>
+            <a:off x="7765325" y="1237250"/>
+            <a:ext cx="1736694" cy="369332"/>
+          </a:xfrm>
+          <a:prstGeom prst="rect">
+            <a:avLst/>
+          </a:prstGeom>
+          <a:noFill/>
+        </p:spPr>
+        <p:txBody>
+          <a:bodyPr wrap="none" rtlCol="0">
+            <a:spAutoFit/>
+          </a:bodyPr>
+          <a:lstStyle/>
+          <a:p>
+            <a:r>
+              <a:rPr lang="en-US" altLang="ko-KR" dirty="0" err="1" smtClean="0"/>
+              <a:t>set_raw_value</a:t>
+            </a:r>
+            <a:r>
+              <a:rPr lang="en-US" altLang="ko-KR" dirty="0" smtClean="0"/>
+              <a:t>()</a:t>
+            </a:r>
+            <a:endParaRPr lang="ko-KR" altLang="en-US" dirty="0"/>
+          </a:p>
+        </p:txBody>
+      </p:sp>
+      <p:cxnSp>
+        <p:nvCxnSpPr>
+          <p:cNvPr id="90" name="직선 화살표 연결선 89"/>
+          <p:cNvCxnSpPr/>
+          <p:nvPr/>
+        </p:nvCxnSpPr>
+        <p:spPr>
+          <a:xfrm flipH="1">
+            <a:off x="7763500" y="2225842"/>
+            <a:ext cx="1644041" cy="0"/>
+          </a:xfrm>
+          <a:prstGeom prst="straightConnector1">
+            <a:avLst/>
+          </a:prstGeom>
+          <a:ln>
+            <a:headEnd type="triangle"/>
+            <a:tailEnd type="none"/>
+          </a:ln>
+        </p:spPr>
+        <p:style>
+          <a:lnRef idx="1">
+            <a:schemeClr val="accent1"/>
+          </a:lnRef>
+          <a:fillRef idx="0">
+            <a:schemeClr val="accent1"/>
+          </a:fillRef>
+          <a:effectRef idx="0">
+            <a:schemeClr val="accent1"/>
+          </a:effectRef>
+          <a:fontRef idx="minor">
+            <a:schemeClr val="tx1"/>
+          </a:fontRef>
+        </p:style>
+      </p:cxnSp>
+      <p:sp>
+        <p:nvSpPr>
+          <p:cNvPr id="91" name="TextBox 90"/>
+          <p:cNvSpPr txBox="1"/>
+          <p:nvPr/>
+        </p:nvSpPr>
+        <p:spPr>
+          <a:xfrm>
+            <a:off x="7735918" y="1838828"/>
+            <a:ext cx="1776768" cy="369332"/>
+          </a:xfrm>
+          <a:prstGeom prst="rect">
+            <a:avLst/>
+          </a:prstGeom>
+          <a:noFill/>
+        </p:spPr>
+        <p:txBody>
+          <a:bodyPr wrap="none" rtlCol="0">
+            <a:spAutoFit/>
+          </a:bodyPr>
+          <a:lstStyle/>
+          <a:p>
+            <a:r>
+              <a:rPr lang="en-US" altLang="ko-KR" dirty="0" err="1" smtClean="0"/>
+              <a:t>get_raw_value</a:t>
+            </a:r>
+            <a:r>
+              <a:rPr lang="en-US" altLang="ko-KR" dirty="0" smtClean="0"/>
+              <a:t>()</a:t>
+            </a:r>
+            <a:endParaRPr lang="ko-KR" altLang="en-US" dirty="0"/>
+          </a:p>
+        </p:txBody>
+      </p:sp>
+      <p:cxnSp>
+        <p:nvCxnSpPr>
+          <p:cNvPr id="92" name="직선 화살표 연결선 91"/>
+          <p:cNvCxnSpPr/>
+          <p:nvPr/>
+        </p:nvCxnSpPr>
+        <p:spPr>
+          <a:xfrm>
+            <a:off x="9407541" y="2431475"/>
+            <a:ext cx="1360722" cy="0"/>
+          </a:xfrm>
+          <a:prstGeom prst="straightConnector1">
+            <a:avLst/>
+          </a:prstGeom>
+          <a:ln>
+            <a:tailEnd type="triangle"/>
+          </a:ln>
+        </p:spPr>
+        <p:style>
+          <a:lnRef idx="1">
+            <a:schemeClr val="accent1"/>
+          </a:lnRef>
+          <a:fillRef idx="0">
+            <a:schemeClr val="accent1"/>
+          </a:fillRef>
+          <a:effectRef idx="0">
+            <a:schemeClr val="accent1"/>
+          </a:effectRef>
+          <a:fontRef idx="minor">
+            <a:schemeClr val="tx1"/>
+          </a:fontRef>
+        </p:style>
+      </p:cxnSp>
+      <p:sp>
+        <p:nvSpPr>
+          <p:cNvPr id="93" name="TextBox 92"/>
+          <p:cNvSpPr txBox="1"/>
+          <p:nvPr/>
+        </p:nvSpPr>
+        <p:spPr>
+          <a:xfrm>
+            <a:off x="9554580" y="2117558"/>
+            <a:ext cx="575799" cy="369332"/>
+          </a:xfrm>
+          <a:prstGeom prst="rect">
+            <a:avLst/>
+          </a:prstGeom>
+          <a:noFill/>
+        </p:spPr>
+        <p:txBody>
+          <a:bodyPr wrap="none" rtlCol="0">
+            <a:spAutoFit/>
+          </a:bodyPr>
+          <a:lstStyle/>
+          <a:p>
+            <a:r>
+              <a:rPr lang="en-US" altLang="ko-KR" dirty="0" smtClean="0"/>
+              <a:t>Out</a:t>
+            </a:r>
+            <a:endParaRPr lang="ko-KR" altLang="en-US" dirty="0"/>
+          </a:p>
+        </p:txBody>
+      </p:sp>
+      <p:sp>
+        <p:nvSpPr>
+          <p:cNvPr id="94" name="왼쪽으로 구부러진 화살표 93"/>
+          <p:cNvSpPr/>
+          <p:nvPr/>
+        </p:nvSpPr>
+        <p:spPr>
+          <a:xfrm>
+            <a:off x="10768263" y="992539"/>
+            <a:ext cx="759417" cy="1846665"/>
+          </a:xfrm>
+          <a:prstGeom prst="curvedLeftArrow">
+            <a:avLst/>
+          </a:prstGeom>
+        </p:spPr>
+        <p:style>
+          <a:lnRef idx="2">
+            <a:schemeClr val="accent1">
+              <a:shade val="50000"/>
+            </a:schemeClr>
+          </a:lnRef>
+          <a:fillRef idx="1">
+            <a:schemeClr val="accent1"/>
+          </a:fillRef>
+          <a:effectRef idx="0">
+            <a:schemeClr val="accent1"/>
+          </a:effectRef>
+          <a:fontRef idx="minor">
+            <a:schemeClr val="lt1"/>
+          </a:fontRef>
+        </p:style>
+        <p:txBody>
+          <a:bodyPr rtlCol="0" anchor="ctr"/>
+          <a:lstStyle/>
+          <a:p>
+            <a:pPr algn="ctr"/>
+            <a:endParaRPr lang="ko-KR" altLang="en-US">
+              <a:solidFill>
+                <a:schemeClr val="tx1"/>
+              </a:solidFill>
+            </a:endParaRPr>
+          </a:p>
+        </p:txBody>
+      </p:sp>
+      <p:sp>
+        <p:nvSpPr>
+          <p:cNvPr id="95" name="TextBox 94"/>
+          <p:cNvSpPr txBox="1"/>
+          <p:nvPr/>
+        </p:nvSpPr>
+        <p:spPr>
+          <a:xfrm>
+            <a:off x="10872606" y="642078"/>
+            <a:ext cx="708848" cy="369332"/>
+          </a:xfrm>
+          <a:prstGeom prst="rect">
+            <a:avLst/>
+          </a:prstGeom>
+          <a:noFill/>
+        </p:spPr>
+        <p:txBody>
+          <a:bodyPr wrap="none" rtlCol="0">
+            <a:spAutoFit/>
+          </a:bodyPr>
+          <a:lstStyle/>
+          <a:p>
+            <a:r>
+              <a:rPr lang="en-US" altLang="ko-KR" dirty="0" smtClean="0"/>
+              <a:t>Loop</a:t>
+            </a:r>
+            <a:endParaRPr lang="ko-KR" altLang="en-US" dirty="0"/>
+          </a:p>
+        </p:txBody>
+      </p:sp>
+      <p:sp>
+        <p:nvSpPr>
+          <p:cNvPr id="96" name="직사각형 95"/>
+          <p:cNvSpPr/>
+          <p:nvPr/>
+        </p:nvSpPr>
+        <p:spPr>
+          <a:xfrm>
+            <a:off x="3165234" y="829726"/>
+            <a:ext cx="113122" cy="2768996"/>
+          </a:xfrm>
+          <a:prstGeom prst="rect">
+            <a:avLst/>
+          </a:prstGeom>
+        </p:spPr>
+        <p:style>
+          <a:lnRef idx="2">
+            <a:schemeClr val="accent1">
+              <a:shade val="50000"/>
+            </a:schemeClr>
+          </a:lnRef>
+          <a:fillRef idx="1">
+            <a:schemeClr val="accent1"/>
+          </a:fillRef>
+          <a:effectRef idx="0">
+            <a:schemeClr val="accent1"/>
+          </a:effectRef>
+          <a:fontRef idx="minor">
+            <a:schemeClr val="lt1"/>
+          </a:fontRef>
+        </p:style>
+        <p:txBody>
+          <a:bodyPr rtlCol="0" anchor="ctr"/>
+          <a:lstStyle/>
+          <a:p>
+            <a:pPr algn="ctr"/>
+            <a:endParaRPr lang="ko-KR" altLang="en-US"/>
+          </a:p>
+        </p:txBody>
+      </p:sp>
+      <p:sp>
+        <p:nvSpPr>
+          <p:cNvPr id="97" name="직사각형 96"/>
+          <p:cNvSpPr/>
+          <p:nvPr/>
+        </p:nvSpPr>
+        <p:spPr>
+          <a:xfrm>
+            <a:off x="5244237" y="3445225"/>
+            <a:ext cx="113122" cy="2768996"/>
+          </a:xfrm>
+          <a:prstGeom prst="rect">
+            <a:avLst/>
+          </a:prstGeom>
+        </p:spPr>
+        <p:style>
+          <a:lnRef idx="2">
+            <a:schemeClr val="accent1">
+              <a:shade val="50000"/>
+            </a:schemeClr>
+          </a:lnRef>
+          <a:fillRef idx="1">
+            <a:schemeClr val="accent1"/>
+          </a:fillRef>
+          <a:effectRef idx="0">
+            <a:schemeClr val="accent1"/>
+          </a:effectRef>
+          <a:fontRef idx="minor">
+            <a:schemeClr val="lt1"/>
+          </a:fontRef>
+        </p:style>
+        <p:txBody>
+          <a:bodyPr rtlCol="0" anchor="ctr"/>
+          <a:lstStyle/>
+          <a:p>
+            <a:pPr algn="ctr"/>
+            <a:endParaRPr lang="ko-KR" altLang="en-US"/>
+          </a:p>
+        </p:txBody>
+      </p:sp>
+      <p:sp>
+        <p:nvSpPr>
+          <p:cNvPr id="98" name="직사각형 97"/>
+          <p:cNvSpPr/>
+          <p:nvPr/>
+        </p:nvSpPr>
+        <p:spPr>
+          <a:xfrm>
+            <a:off x="7706935" y="980891"/>
+            <a:ext cx="110056" cy="1704566"/>
+          </a:xfrm>
+          <a:prstGeom prst="rect">
+            <a:avLst/>
+          </a:prstGeom>
+        </p:spPr>
+        <p:style>
+          <a:lnRef idx="2">
+            <a:schemeClr val="accent1">
+              <a:shade val="50000"/>
+            </a:schemeClr>
+          </a:lnRef>
+          <a:fillRef idx="1">
+            <a:schemeClr val="accent1"/>
+          </a:fillRef>
+          <a:effectRef idx="0">
+            <a:schemeClr val="accent1"/>
+          </a:effectRef>
+          <a:fontRef idx="minor">
+            <a:schemeClr val="lt1"/>
+          </a:fontRef>
+        </p:style>
+        <p:txBody>
+          <a:bodyPr rtlCol="0" anchor="ctr"/>
+          <a:lstStyle/>
+          <a:p>
+            <a:pPr algn="ctr"/>
+            <a:endParaRPr lang="ko-KR" altLang="en-US"/>
+          </a:p>
+        </p:txBody>
+      </p:sp>
+      <p:sp>
+        <p:nvSpPr>
+          <p:cNvPr id="99" name="TextBox 98"/>
+          <p:cNvSpPr txBox="1"/>
+          <p:nvPr/>
+        </p:nvSpPr>
+        <p:spPr>
+          <a:xfrm>
+            <a:off x="131068" y="213197"/>
+            <a:ext cx="2592543" cy="369332"/>
+          </a:xfrm>
+          <a:prstGeom prst="rect">
+            <a:avLst/>
+          </a:prstGeom>
+          <a:noFill/>
+        </p:spPr>
+        <p:txBody>
+          <a:bodyPr wrap="square" rtlCol="0">
+            <a:spAutoFit/>
+          </a:bodyPr>
+          <a:lstStyle/>
+          <a:p>
+            <a:r>
+              <a:rPr lang="en-US" altLang="ko-KR" dirty="0" smtClean="0"/>
+              <a:t>Option #2 :</a:t>
+            </a:r>
+            <a:endParaRPr lang="ko-KR" altLang="en-US" dirty="0"/>
+          </a:p>
+        </p:txBody>
+      </p:sp>
+      <p:sp>
+        <p:nvSpPr>
+          <p:cNvPr id="106" name="TextBox 105"/>
+          <p:cNvSpPr txBox="1"/>
+          <p:nvPr/>
+        </p:nvSpPr>
+        <p:spPr>
+          <a:xfrm>
+            <a:off x="5489272" y="4686854"/>
+            <a:ext cx="1776768" cy="369332"/>
+          </a:xfrm>
+          <a:prstGeom prst="rect">
+            <a:avLst/>
+          </a:prstGeom>
+          <a:noFill/>
+        </p:spPr>
+        <p:txBody>
+          <a:bodyPr wrap="none" rtlCol="0">
+            <a:spAutoFit/>
+          </a:bodyPr>
+          <a:lstStyle/>
+          <a:p>
+            <a:r>
+              <a:rPr lang="en-US" altLang="ko-KR" dirty="0" err="1" smtClean="0"/>
+              <a:t>get_raw_value</a:t>
+            </a:r>
+            <a:r>
+              <a:rPr lang="en-US" altLang="ko-KR" dirty="0" smtClean="0"/>
+              <a:t>()</a:t>
+            </a:r>
+            <a:endParaRPr lang="ko-KR" altLang="en-US" dirty="0"/>
+          </a:p>
+        </p:txBody>
+      </p:sp>
+      <p:cxnSp>
+        <p:nvCxnSpPr>
+          <p:cNvPr id="107" name="직선 화살표 연결선 106"/>
+          <p:cNvCxnSpPr/>
+          <p:nvPr/>
+        </p:nvCxnSpPr>
+        <p:spPr>
+          <a:xfrm flipH="1">
+            <a:off x="5357359" y="5064840"/>
+            <a:ext cx="2362098" cy="0"/>
+          </a:xfrm>
+          <a:prstGeom prst="straightConnector1">
+            <a:avLst/>
+          </a:prstGeom>
+          <a:ln>
+            <a:tailEnd type="triangle"/>
+          </a:ln>
+        </p:spPr>
+        <p:style>
+          <a:lnRef idx="1">
+            <a:schemeClr val="accent1"/>
+          </a:lnRef>
+          <a:fillRef idx="0">
+            <a:schemeClr val="accent1"/>
+          </a:fillRef>
+          <a:effectRef idx="0">
+            <a:schemeClr val="accent1"/>
+          </a:effectRef>
+          <a:fontRef idx="minor">
+            <a:schemeClr val="tx1"/>
+          </a:fontRef>
+        </p:style>
+      </p:cxnSp>
+      <p:sp>
+        <p:nvSpPr>
+          <p:cNvPr id="108" name="TextBox 107"/>
+          <p:cNvSpPr txBox="1"/>
+          <p:nvPr/>
+        </p:nvSpPr>
+        <p:spPr>
+          <a:xfrm>
+            <a:off x="5486565" y="5067297"/>
+            <a:ext cx="1736694" cy="369332"/>
+          </a:xfrm>
+          <a:prstGeom prst="rect">
+            <a:avLst/>
+          </a:prstGeom>
+          <a:noFill/>
+        </p:spPr>
+        <p:txBody>
+          <a:bodyPr wrap="none" rtlCol="0">
+            <a:spAutoFit/>
+          </a:bodyPr>
+          <a:lstStyle/>
+          <a:p>
+            <a:r>
+              <a:rPr lang="en-US" altLang="ko-KR" dirty="0" err="1" smtClean="0"/>
+              <a:t>set_raw_value</a:t>
+            </a:r>
+            <a:r>
+              <a:rPr lang="en-US" altLang="ko-KR" dirty="0" smtClean="0"/>
+              <a:t>()</a:t>
+            </a:r>
+            <a:endParaRPr lang="ko-KR" altLang="en-US" dirty="0"/>
+          </a:p>
+        </p:txBody>
+      </p:sp>
+      <p:cxnSp>
+        <p:nvCxnSpPr>
+          <p:cNvPr id="109" name="직선 화살표 연결선 108"/>
+          <p:cNvCxnSpPr/>
+          <p:nvPr/>
+        </p:nvCxnSpPr>
+        <p:spPr>
+          <a:xfrm flipH="1">
+            <a:off x="5357359" y="5392981"/>
+            <a:ext cx="2391773" cy="0"/>
+          </a:xfrm>
+          <a:prstGeom prst="straightConnector1">
+            <a:avLst/>
+          </a:prstGeom>
+          <a:ln>
+            <a:tailEnd type="triangle"/>
+          </a:ln>
+        </p:spPr>
+        <p:style>
+          <a:lnRef idx="1">
+            <a:schemeClr val="accent1"/>
+          </a:lnRef>
+          <a:fillRef idx="0">
+            <a:schemeClr val="accent1"/>
+          </a:fillRef>
+          <a:effectRef idx="0">
+            <a:schemeClr val="accent1"/>
+          </a:effectRef>
+          <a:fontRef idx="minor">
+            <a:schemeClr val="tx1"/>
+          </a:fontRef>
+        </p:style>
+      </p:cxnSp>
+      <p:sp>
+        <p:nvSpPr>
+          <p:cNvPr id="112" name="TextBox 111"/>
+          <p:cNvSpPr txBox="1"/>
+          <p:nvPr/>
+        </p:nvSpPr>
+        <p:spPr>
+          <a:xfrm>
+            <a:off x="8054613" y="3854032"/>
+            <a:ext cx="3640082" cy="2585323"/>
+          </a:xfrm>
+          <a:prstGeom prst="rect">
+            <a:avLst/>
+          </a:prstGeom>
+          <a:noFill/>
+        </p:spPr>
+        <p:txBody>
+          <a:bodyPr wrap="square" rtlCol="0">
+            <a:spAutoFit/>
+          </a:bodyPr>
+          <a:lstStyle/>
+          <a:p>
+            <a:r>
+              <a:rPr lang="en-US" altLang="ko-KR" dirty="0" smtClean="0"/>
+              <a:t>Pros</a:t>
+            </a:r>
+          </a:p>
+          <a:p>
+            <a:r>
+              <a:rPr lang="en-US" altLang="ko-KR" dirty="0"/>
+              <a:t> </a:t>
+            </a:r>
+            <a:r>
+              <a:rPr lang="en-US" altLang="ko-KR" dirty="0" smtClean="0"/>
+              <a:t>autonomy</a:t>
+            </a:r>
+          </a:p>
+          <a:p>
+            <a:r>
+              <a:rPr lang="en-US" altLang="ko-KR" dirty="0"/>
+              <a:t> </a:t>
+            </a:r>
+            <a:r>
+              <a:rPr lang="en-US" altLang="ko-KR" dirty="0" smtClean="0"/>
+              <a:t>easier to implement   </a:t>
+            </a:r>
+          </a:p>
+          <a:p>
+            <a:r>
+              <a:rPr lang="en-US" altLang="ko-KR" dirty="0"/>
+              <a:t> </a:t>
+            </a:r>
+            <a:r>
+              <a:rPr lang="en-US" altLang="ko-KR" dirty="0" smtClean="0"/>
+              <a:t>channel time delay</a:t>
+            </a:r>
+          </a:p>
+          <a:p>
+            <a:r>
+              <a:rPr lang="en-US" altLang="ko-KR" dirty="0"/>
+              <a:t> </a:t>
+            </a:r>
+            <a:r>
+              <a:rPr lang="en-US" altLang="ko-KR" dirty="0" smtClean="0"/>
+              <a:t>synchronized IO handling</a:t>
+            </a:r>
+          </a:p>
+          <a:p>
+            <a:endParaRPr lang="en-US" altLang="ko-KR" dirty="0"/>
+          </a:p>
+          <a:p>
+            <a:r>
+              <a:rPr lang="en-US" altLang="ko-KR" dirty="0" smtClean="0"/>
+              <a:t>Cons</a:t>
+            </a:r>
+          </a:p>
+          <a:p>
+            <a:r>
+              <a:rPr lang="en-US" altLang="ko-KR" dirty="0"/>
+              <a:t> </a:t>
+            </a:r>
+            <a:r>
+              <a:rPr lang="en-US" altLang="ko-KR" dirty="0" smtClean="0"/>
+              <a:t> more memory</a:t>
+            </a:r>
+          </a:p>
+          <a:p>
+            <a:r>
+              <a:rPr lang="en-US" altLang="ko-KR" dirty="0"/>
+              <a:t> </a:t>
+            </a:r>
+            <a:r>
+              <a:rPr lang="en-US" altLang="ko-KR" dirty="0" smtClean="0"/>
+              <a:t> more complicated</a:t>
+            </a:r>
+            <a:endParaRPr lang="ko-KR" altLang="en-US" dirty="0"/>
+          </a:p>
+        </p:txBody>
+      </p:sp>
+    </p:spTree>
+    <p:extLst>
+      <p:ext uri="{BB962C8B-B14F-4D97-AF65-F5344CB8AC3E}">
+        <p14:creationId xmlns:p14="http://schemas.microsoft.com/office/powerpoint/2010/main" val="2209339502"/>
+      </p:ext>
+    </p:extLst>
+  </p:cSld>
+  <p:clrMapOvr>
+    <a:masterClrMapping/>
+  </p:clrMapOvr>
+</p:sld>
+</file>
+
 <file path=ppt/theme/theme1.xml><?xml version="1.0" encoding="utf-8"?>
 <a:theme xmlns:a="http://schemas.openxmlformats.org/drawingml/2006/main" name="Office 테마">
   <a:themeElements>

</xml_diff>